<commit_message>
Tweaking the GetOnTheBus preso
</commit_message>
<xml_diff>
--- a/GetOnTheBus/Get on the Bus with MassTransit.pptx
+++ b/GetOnTheBus/Get on the Bus with MassTransit.pptx
@@ -2,7 +2,7 @@
 <file path=ppt/presentation.xml><?xml version="1.0" encoding="utf-8"?>
 <p:presentation xmlns:a="http://schemas.openxmlformats.org/drawingml/2006/main" xmlns:r="http://schemas.openxmlformats.org/officeDocument/2006/relationships" xmlns:p="http://schemas.openxmlformats.org/presentationml/2006/main" saveSubsetFonts="1">
   <p:sldMasterIdLst>
-    <p:sldMasterId id="2147483648" r:id="rId1"/>
+    <p:sldMasterId id="2147483720" r:id="rId1"/>
   </p:sldMasterIdLst>
   <p:sldIdLst>
     <p:sldId id="256" r:id="rId2"/>
@@ -139,19 +139,28 @@
         </p:nvSpPr>
         <p:spPr>
           <a:xfrm>
-            <a:off x="685800" y="2130425"/>
-            <a:ext cx="7772400" cy="1470025"/>
+            <a:off x="685800" y="609601"/>
+            <a:ext cx="7772400" cy="4267200"/>
           </a:xfrm>
         </p:spPr>
         <p:txBody>
-          <a:bodyPr/>
-          <a:lstStyle/>
+          <a:bodyPr anchor="b">
+            <a:noAutofit/>
+          </a:bodyPr>
+          <a:lstStyle>
+            <a:lvl1pPr>
+              <a:lnSpc>
+                <a:spcPct val="100000"/>
+              </a:lnSpc>
+              <a:defRPr sz="8000"/>
+            </a:lvl1pPr>
+          </a:lstStyle>
           <a:p>
             <a:r>
               <a:rPr lang="en-US" smtClean="0"/>
               <a:t>Click to edit Master title style</a:t>
             </a:r>
-            <a:endParaRPr lang="en-US"/>
+            <a:endParaRPr lang="en-US" dirty="0"/>
           </a:p>
         </p:txBody>
       </p:sp>
@@ -167,16 +176,18 @@
         </p:nvSpPr>
         <p:spPr>
           <a:xfrm>
-            <a:off x="1371600" y="3886200"/>
-            <a:ext cx="6400800" cy="1752600"/>
+            <a:off x="1371600" y="4953000"/>
+            <a:ext cx="6400800" cy="1219200"/>
           </a:xfrm>
         </p:spPr>
         <p:txBody>
-          <a:bodyPr/>
+          <a:bodyPr>
+            <a:normAutofit/>
+          </a:bodyPr>
           <a:lstStyle>
             <a:lvl1pPr marL="0" indent="0" algn="ctr">
               <a:buNone/>
-              <a:defRPr>
+              <a:defRPr sz="2400">
                 <a:solidFill>
                   <a:schemeClr val="tx1">
                     <a:tint val="75000"/>
@@ -270,13 +281,13 @@
               <a:rPr lang="en-US" smtClean="0"/>
               <a:t>Click to edit Master subtitle style</a:t>
             </a:r>
-            <a:endParaRPr lang="en-US"/>
-          </a:p>
-        </p:txBody>
-      </p:sp>
-      <p:sp>
-        <p:nvSpPr>
-          <p:cNvPr id="4" name="Date Placeholder 3"/>
+            <a:endParaRPr lang="en-US" dirty="0"/>
+          </a:p>
+        </p:txBody>
+      </p:sp>
+      <p:sp>
+        <p:nvSpPr>
+          <p:cNvPr id="7" name="Date Placeholder 6"/>
           <p:cNvSpPr>
             <a:spLocks noGrp="1"/>
           </p:cNvSpPr>
@@ -291,7 +302,7 @@
           <a:p>
             <a:fld id="{5A87423E-21AC-4CFB-A97C-80CE3F3C4BEE}" type="datetimeFigureOut">
               <a:rPr lang="en-US" smtClean="0"/>
-              <a:t>5/3/2012</a:t>
+              <a:t>5/4/2012</a:t>
             </a:fld>
             <a:endParaRPr lang="en-US"/>
           </a:p>
@@ -299,31 +310,12 @@
       </p:sp>
       <p:sp>
         <p:nvSpPr>
-          <p:cNvPr id="5" name="Footer Placeholder 4"/>
-          <p:cNvSpPr>
-            <a:spLocks noGrp="1"/>
-          </p:cNvSpPr>
-          <p:nvPr>
-            <p:ph type="ftr" sz="quarter" idx="11"/>
-          </p:nvPr>
-        </p:nvSpPr>
-        <p:spPr/>
-        <p:txBody>
-          <a:bodyPr/>
-          <a:lstStyle/>
-          <a:p>
-            <a:endParaRPr lang="en-US"/>
-          </a:p>
-        </p:txBody>
-      </p:sp>
-      <p:sp>
-        <p:nvSpPr>
-          <p:cNvPr id="6" name="Slide Number Placeholder 5"/>
-          <p:cNvSpPr>
-            <a:spLocks noGrp="1"/>
-          </p:cNvSpPr>
-          <p:nvPr>
-            <p:ph type="sldNum" sz="quarter" idx="12"/>
+          <p:cNvPr id="8" name="Slide Number Placeholder 7"/>
+          <p:cNvSpPr>
+            <a:spLocks noGrp="1"/>
+          </p:cNvSpPr>
+          <p:nvPr>
+            <p:ph type="sldNum" sz="quarter" idx="11"/>
           </p:nvPr>
         </p:nvSpPr>
         <p:spPr/>
@@ -339,12 +331,26 @@
           </a:p>
         </p:txBody>
       </p:sp>
+      <p:sp>
+        <p:nvSpPr>
+          <p:cNvPr id="9" name="Footer Placeholder 8"/>
+          <p:cNvSpPr>
+            <a:spLocks noGrp="1"/>
+          </p:cNvSpPr>
+          <p:nvPr>
+            <p:ph type="ftr" sz="quarter" idx="12"/>
+          </p:nvPr>
+        </p:nvSpPr>
+        <p:spPr/>
+        <p:txBody>
+          <a:bodyPr/>
+          <a:lstStyle/>
+          <a:p>
+            <a:endParaRPr lang="en-US"/>
+          </a:p>
+        </p:txBody>
+      </p:sp>
     </p:spTree>
-    <p:extLst>
-      <p:ext uri="{BB962C8B-B14F-4D97-AF65-F5344CB8AC3E}">
-        <p14:creationId xmlns:p14="http://schemas.microsoft.com/office/powerpoint/2010/main" val="3324772128"/>
-      </p:ext>
-    </p:extLst>
   </p:cSld>
   <p:clrMapOvr>
     <a:masterClrMapping/>
@@ -388,7 +394,7 @@
               <a:rPr lang="en-US" smtClean="0"/>
               <a:t>Click to edit Master title style</a:t>
             </a:r>
-            <a:endParaRPr lang="en-US"/>
+            <a:endParaRPr lang="en-US" dirty="0"/>
           </a:p>
         </p:txBody>
       </p:sp>
@@ -461,7 +467,7 @@
           <a:p>
             <a:fld id="{5A87423E-21AC-4CFB-A97C-80CE3F3C4BEE}" type="datetimeFigureOut">
               <a:rPr lang="en-US" smtClean="0"/>
-              <a:t>5/3/2012</a:t>
+              <a:t>5/4/2012</a:t>
             </a:fld>
             <a:endParaRPr lang="en-US"/>
           </a:p>
@@ -510,11 +516,6 @@
         </p:txBody>
       </p:sp>
     </p:spTree>
-    <p:extLst>
-      <p:ext uri="{BB962C8B-B14F-4D97-AF65-F5344CB8AC3E}">
-        <p14:creationId xmlns:p14="http://schemas.microsoft.com/office/powerpoint/2010/main" val="4086202895"/>
-      </p:ext>
-    </p:extLst>
   </p:cSld>
   <p:clrMapOvr>
     <a:masterClrMapping/>
@@ -563,7 +564,7 @@
               <a:rPr lang="en-US" smtClean="0"/>
               <a:t>Click to edit Master title style</a:t>
             </a:r>
-            <a:endParaRPr lang="en-US"/>
+            <a:endParaRPr lang="en-US" dirty="0"/>
           </a:p>
         </p:txBody>
       </p:sp>
@@ -641,7 +642,7 @@
           <a:p>
             <a:fld id="{5A87423E-21AC-4CFB-A97C-80CE3F3C4BEE}" type="datetimeFigureOut">
               <a:rPr lang="en-US" smtClean="0"/>
-              <a:t>5/3/2012</a:t>
+              <a:t>5/4/2012</a:t>
             </a:fld>
             <a:endParaRPr lang="en-US"/>
           </a:p>
@@ -690,11 +691,6 @@
         </p:txBody>
       </p:sp>
     </p:spTree>
-    <p:extLst>
-      <p:ext uri="{BB962C8B-B14F-4D97-AF65-F5344CB8AC3E}">
-        <p14:creationId xmlns:p14="http://schemas.microsoft.com/office/powerpoint/2010/main" val="2450943128"/>
-      </p:ext>
-    </p:extLst>
   </p:cSld>
   <p:clrMapOvr>
     <a:masterClrMapping/>
@@ -738,7 +734,7 @@
               <a:rPr lang="en-US" smtClean="0"/>
               <a:t>Click to edit Master title style</a:t>
             </a:r>
-            <a:endParaRPr lang="en-US"/>
+            <a:endParaRPr lang="en-US" dirty="0"/>
           </a:p>
         </p:txBody>
       </p:sp>
@@ -755,7 +751,25 @@
         <p:spPr/>
         <p:txBody>
           <a:bodyPr/>
-          <a:lstStyle/>
+          <a:lstStyle>
+            <a:lvl5pPr>
+              <a:defRPr/>
+            </a:lvl5pPr>
+            <a:lvl6pPr>
+              <a:defRPr/>
+            </a:lvl6pPr>
+            <a:lvl7pPr>
+              <a:defRPr/>
+            </a:lvl7pPr>
+            <a:lvl8pPr>
+              <a:defRPr/>
+            </a:lvl8pPr>
+            <a:lvl9pPr>
+              <a:buFont typeface="Arial" pitchFamily="34" charset="0"/>
+              <a:buChar char="•"/>
+              <a:defRPr/>
+            </a:lvl9pPr>
+          </a:lstStyle>
           <a:p>
             <a:pPr lvl="0"/>
             <a:r>
@@ -790,7 +804,7 @@
               <a:rPr lang="en-US" smtClean="0"/>
               <a:t>Fifth level</a:t>
             </a:r>
-            <a:endParaRPr lang="en-US"/>
+            <a:endParaRPr lang="en-US" dirty="0" smtClean="0"/>
           </a:p>
         </p:txBody>
       </p:sp>
@@ -811,7 +825,7 @@
           <a:p>
             <a:fld id="{5A87423E-21AC-4CFB-A97C-80CE3F3C4BEE}" type="datetimeFigureOut">
               <a:rPr lang="en-US" smtClean="0"/>
-              <a:t>5/3/2012</a:t>
+              <a:t>5/4/2012</a:t>
             </a:fld>
             <a:endParaRPr lang="en-US"/>
           </a:p>
@@ -860,11 +874,6 @@
         </p:txBody>
       </p:sp>
     </p:spTree>
-    <p:extLst>
-      <p:ext uri="{BB962C8B-B14F-4D97-AF65-F5344CB8AC3E}">
-        <p14:creationId xmlns:p14="http://schemas.microsoft.com/office/powerpoint/2010/main" val="3068066106"/>
-      </p:ext>
-    </p:extLst>
   </p:cSld>
   <p:clrMapOvr>
     <a:masterClrMapping/>
@@ -901,46 +910,67 @@
         </p:nvSpPr>
         <p:spPr>
           <a:xfrm>
-            <a:off x="722313" y="4406900"/>
-            <a:ext cx="7772400" cy="1362075"/>
+            <a:off x="722313" y="1371600"/>
+            <a:ext cx="7772400" cy="2505075"/>
           </a:xfrm>
         </p:spPr>
         <p:txBody>
+          <a:bodyPr anchor="b"/>
+          <a:lstStyle>
+            <a:lvl1pPr algn="ctr" defTabSz="914400" rtl="0" eaLnBrk="1" latinLnBrk="0" hangingPunct="1">
+              <a:lnSpc>
+                <a:spcPct val="100000"/>
+              </a:lnSpc>
+              <a:spcBef>
+                <a:spcPct val="0"/>
+              </a:spcBef>
+              <a:buNone/>
+              <a:defRPr lang="en-US" sz="4800" kern="1200" dirty="0" smtClean="0">
+                <a:solidFill>
+                  <a:schemeClr val="tx2"/>
+                </a:solidFill>
+                <a:effectLst>
+                  <a:outerShdw blurRad="63500" dist="38100" dir="5400000" algn="t" rotWithShape="0">
+                    <a:prstClr val="black">
+                      <a:alpha val="25000"/>
+                    </a:prstClr>
+                  </a:outerShdw>
+                </a:effectLst>
+                <a:latin typeface="+mn-lt"/>
+                <a:ea typeface="+mj-ea"/>
+                <a:cs typeface="+mj-cs"/>
+              </a:defRPr>
+            </a:lvl1pPr>
+          </a:lstStyle>
+          <a:p>
+            <a:r>
+              <a:rPr lang="en-US" smtClean="0"/>
+              <a:t>Click to edit Master title style</a:t>
+            </a:r>
+            <a:endParaRPr lang="en-US" dirty="0"/>
+          </a:p>
+        </p:txBody>
+      </p:sp>
+      <p:sp>
+        <p:nvSpPr>
+          <p:cNvPr id="3" name="Text Placeholder 2"/>
+          <p:cNvSpPr>
+            <a:spLocks noGrp="1"/>
+          </p:cNvSpPr>
+          <p:nvPr>
+            <p:ph type="body" idx="1"/>
+          </p:nvPr>
+        </p:nvSpPr>
+        <p:spPr>
+          <a:xfrm>
+            <a:off x="722313" y="4068763"/>
+            <a:ext cx="7772400" cy="1131887"/>
+          </a:xfrm>
+        </p:spPr>
+        <p:txBody>
           <a:bodyPr anchor="t"/>
           <a:lstStyle>
-            <a:lvl1pPr algn="l">
-              <a:defRPr sz="4000" b="1" cap="all"/>
-            </a:lvl1pPr>
-          </a:lstStyle>
-          <a:p>
-            <a:r>
-              <a:rPr lang="en-US" smtClean="0"/>
-              <a:t>Click to edit Master title style</a:t>
-            </a:r>
-            <a:endParaRPr lang="en-US"/>
-          </a:p>
-        </p:txBody>
-      </p:sp>
-      <p:sp>
-        <p:nvSpPr>
-          <p:cNvPr id="3" name="Text Placeholder 2"/>
-          <p:cNvSpPr>
-            <a:spLocks noGrp="1"/>
-          </p:cNvSpPr>
-          <p:nvPr>
-            <p:ph type="body" idx="1"/>
-          </p:nvPr>
-        </p:nvSpPr>
-        <p:spPr>
-          <a:xfrm>
-            <a:off x="722313" y="2906713"/>
-            <a:ext cx="7772400" cy="1500187"/>
-          </a:xfrm>
-        </p:spPr>
-        <p:txBody>
-          <a:bodyPr anchor="b"/>
-          <a:lstStyle>
-            <a:lvl1pPr marL="0" indent="0">
+            <a:lvl1pPr marL="0" indent="0" algn="ctr">
               <a:buNone/>
               <a:defRPr sz="2000">
                 <a:solidFill>
@@ -1057,7 +1087,7 @@
           <a:p>
             <a:fld id="{5A87423E-21AC-4CFB-A97C-80CE3F3C4BEE}" type="datetimeFigureOut">
               <a:rPr lang="en-US" smtClean="0"/>
-              <a:t>5/3/2012</a:t>
+              <a:t>5/4/2012</a:t>
             </a:fld>
             <a:endParaRPr lang="en-US"/>
           </a:p>
@@ -1105,12 +1135,157 @@
           </a:p>
         </p:txBody>
       </p:sp>
+      <p:sp>
+        <p:nvSpPr>
+          <p:cNvPr id="7" name="Oval 6"/>
+          <p:cNvSpPr/>
+          <p:nvPr/>
+        </p:nvSpPr>
+        <p:spPr>
+          <a:xfrm>
+            <a:off x="4495800" y="3924300"/>
+            <a:ext cx="84772" cy="84772"/>
+          </a:xfrm>
+          <a:prstGeom prst="ellipse">
+            <a:avLst/>
+          </a:prstGeom>
+          <a:solidFill>
+            <a:schemeClr val="tx1">
+              <a:lumMod val="50000"/>
+              <a:lumOff val="50000"/>
+            </a:schemeClr>
+          </a:solidFill>
+          <a:ln w="12700">
+            <a:noFill/>
+          </a:ln>
+          <a:effectLst/>
+        </p:spPr>
+        <p:style>
+          <a:lnRef idx="2">
+            <a:schemeClr val="accent1">
+              <a:shade val="50000"/>
+            </a:schemeClr>
+          </a:lnRef>
+          <a:fillRef idx="1">
+            <a:schemeClr val="accent1"/>
+          </a:fillRef>
+          <a:effectRef idx="0">
+            <a:schemeClr val="accent1"/>
+          </a:effectRef>
+          <a:fontRef idx="minor">
+            <a:schemeClr val="lt1"/>
+          </a:fontRef>
+        </p:style>
+        <p:txBody>
+          <a:bodyPr rtlCol="0" anchor="ctr"/>
+          <a:lstStyle/>
+          <a:p>
+            <a:pPr algn="ctr"/>
+            <a:endParaRPr lang="en-US"/>
+          </a:p>
+        </p:txBody>
+      </p:sp>
+      <p:sp>
+        <p:nvSpPr>
+          <p:cNvPr id="8" name="Oval 7"/>
+          <p:cNvSpPr/>
+          <p:nvPr/>
+        </p:nvSpPr>
+        <p:spPr>
+          <a:xfrm>
+            <a:off x="4695825" y="3924300"/>
+            <a:ext cx="84772" cy="84772"/>
+          </a:xfrm>
+          <a:prstGeom prst="ellipse">
+            <a:avLst/>
+          </a:prstGeom>
+          <a:solidFill>
+            <a:schemeClr val="tx1">
+              <a:lumMod val="50000"/>
+              <a:lumOff val="50000"/>
+            </a:schemeClr>
+          </a:solidFill>
+          <a:ln w="12700">
+            <a:noFill/>
+          </a:ln>
+          <a:effectLst/>
+        </p:spPr>
+        <p:style>
+          <a:lnRef idx="2">
+            <a:schemeClr val="accent1">
+              <a:shade val="50000"/>
+            </a:schemeClr>
+          </a:lnRef>
+          <a:fillRef idx="1">
+            <a:schemeClr val="accent1"/>
+          </a:fillRef>
+          <a:effectRef idx="0">
+            <a:schemeClr val="accent1"/>
+          </a:effectRef>
+          <a:fontRef idx="minor">
+            <a:schemeClr val="lt1"/>
+          </a:fontRef>
+        </p:style>
+        <p:txBody>
+          <a:bodyPr rtlCol="0" anchor="ctr"/>
+          <a:lstStyle/>
+          <a:p>
+            <a:pPr algn="ctr"/>
+            <a:endParaRPr lang="en-US"/>
+          </a:p>
+        </p:txBody>
+      </p:sp>
+      <p:sp>
+        <p:nvSpPr>
+          <p:cNvPr id="9" name="Oval 8"/>
+          <p:cNvSpPr/>
+          <p:nvPr/>
+        </p:nvSpPr>
+        <p:spPr>
+          <a:xfrm>
+            <a:off x="4296728" y="3924300"/>
+            <a:ext cx="84772" cy="84772"/>
+          </a:xfrm>
+          <a:prstGeom prst="ellipse">
+            <a:avLst/>
+          </a:prstGeom>
+          <a:solidFill>
+            <a:schemeClr val="tx1">
+              <a:lumMod val="50000"/>
+              <a:lumOff val="50000"/>
+            </a:schemeClr>
+          </a:solidFill>
+          <a:ln w="12700">
+            <a:noFill/>
+          </a:ln>
+          <a:effectLst/>
+        </p:spPr>
+        <p:style>
+          <a:lnRef idx="2">
+            <a:schemeClr val="accent1">
+              <a:shade val="50000"/>
+            </a:schemeClr>
+          </a:lnRef>
+          <a:fillRef idx="1">
+            <a:schemeClr val="accent1"/>
+          </a:fillRef>
+          <a:effectRef idx="0">
+            <a:schemeClr val="accent1"/>
+          </a:effectRef>
+          <a:fontRef idx="minor">
+            <a:schemeClr val="lt1"/>
+          </a:fontRef>
+        </p:style>
+        <p:txBody>
+          <a:bodyPr rtlCol="0" anchor="ctr"/>
+          <a:lstStyle/>
+          <a:p>
+            <a:pPr algn="ctr"/>
+            <a:endParaRPr lang="en-US"/>
+          </a:p>
+        </p:txBody>
+      </p:sp>
     </p:spTree>
-    <p:extLst>
-      <p:ext uri="{BB962C8B-B14F-4D97-AF65-F5344CB8AC3E}">
-        <p14:creationId xmlns:p14="http://schemas.microsoft.com/office/powerpoint/2010/main" val="3694988366"/>
-      </p:ext>
-    </p:extLst>
   </p:cSld>
   <p:clrMapOvr>
     <a:masterClrMapping/>
@@ -1160,91 +1335,6 @@
       </p:sp>
       <p:sp>
         <p:nvSpPr>
-          <p:cNvPr id="3" name="Content Placeholder 2"/>
-          <p:cNvSpPr>
-            <a:spLocks noGrp="1"/>
-          </p:cNvSpPr>
-          <p:nvPr>
-            <p:ph sz="half" idx="1"/>
-          </p:nvPr>
-        </p:nvSpPr>
-        <p:spPr>
-          <a:xfrm>
-            <a:off x="457200" y="1600200"/>
-            <a:ext cx="4038600" cy="4525963"/>
-          </a:xfrm>
-        </p:spPr>
-        <p:txBody>
-          <a:bodyPr/>
-          <a:lstStyle>
-            <a:lvl1pPr>
-              <a:defRPr sz="2800"/>
-            </a:lvl1pPr>
-            <a:lvl2pPr>
-              <a:defRPr sz="2400"/>
-            </a:lvl2pPr>
-            <a:lvl3pPr>
-              <a:defRPr sz="2000"/>
-            </a:lvl3pPr>
-            <a:lvl4pPr>
-              <a:defRPr sz="1800"/>
-            </a:lvl4pPr>
-            <a:lvl5pPr>
-              <a:defRPr sz="1800"/>
-            </a:lvl5pPr>
-            <a:lvl6pPr>
-              <a:defRPr sz="1800"/>
-            </a:lvl6pPr>
-            <a:lvl7pPr>
-              <a:defRPr sz="1800"/>
-            </a:lvl7pPr>
-            <a:lvl8pPr>
-              <a:defRPr sz="1800"/>
-            </a:lvl8pPr>
-            <a:lvl9pPr>
-              <a:defRPr sz="1800"/>
-            </a:lvl9pPr>
-          </a:lstStyle>
-          <a:p>
-            <a:pPr lvl="0"/>
-            <a:r>
-              <a:rPr lang="en-US" smtClean="0"/>
-              <a:t>Click to edit Master text styles</a:t>
-            </a:r>
-          </a:p>
-          <a:p>
-            <a:pPr lvl="1"/>
-            <a:r>
-              <a:rPr lang="en-US" smtClean="0"/>
-              <a:t>Second level</a:t>
-            </a:r>
-          </a:p>
-          <a:p>
-            <a:pPr lvl="2"/>
-            <a:r>
-              <a:rPr lang="en-US" smtClean="0"/>
-              <a:t>Third level</a:t>
-            </a:r>
-          </a:p>
-          <a:p>
-            <a:pPr lvl="3"/>
-            <a:r>
-              <a:rPr lang="en-US" smtClean="0"/>
-              <a:t>Fourth level</a:t>
-            </a:r>
-          </a:p>
-          <a:p>
-            <a:pPr lvl="4"/>
-            <a:r>
-              <a:rPr lang="en-US" smtClean="0"/>
-              <a:t>Fifth level</a:t>
-            </a:r>
-            <a:endParaRPr lang="en-US"/>
-          </a:p>
-        </p:txBody>
-      </p:sp>
-      <p:sp>
-        <p:nvSpPr>
           <p:cNvPr id="4" name="Content Placeholder 3"/>
           <p:cNvSpPr>
             <a:spLocks noGrp="1"/>
@@ -1263,31 +1353,31 @@
           <a:bodyPr/>
           <a:lstStyle>
             <a:lvl1pPr>
-              <a:defRPr sz="2800"/>
+              <a:defRPr sz="2400"/>
             </a:lvl1pPr>
             <a:lvl2pPr>
-              <a:defRPr sz="2400"/>
+              <a:defRPr sz="1600"/>
             </a:lvl2pPr>
             <a:lvl3pPr>
-              <a:defRPr sz="2000"/>
+              <a:defRPr sz="1600"/>
             </a:lvl3pPr>
             <a:lvl4pPr>
-              <a:defRPr sz="1800"/>
+              <a:defRPr sz="1600"/>
             </a:lvl4pPr>
             <a:lvl5pPr>
-              <a:defRPr sz="1800"/>
+              <a:defRPr sz="1600"/>
             </a:lvl5pPr>
             <a:lvl6pPr>
-              <a:defRPr sz="1800"/>
+              <a:defRPr sz="1600"/>
             </a:lvl6pPr>
             <a:lvl7pPr>
-              <a:defRPr sz="1800"/>
+              <a:defRPr sz="1600"/>
             </a:lvl7pPr>
             <a:lvl8pPr>
-              <a:defRPr sz="1800"/>
+              <a:defRPr sz="1600"/>
             </a:lvl8pPr>
             <a:lvl9pPr>
-              <a:defRPr sz="1800"/>
+              <a:defRPr sz="1600"/>
             </a:lvl9pPr>
           </a:lstStyle>
           <a:p>
@@ -1324,7 +1414,7 @@
               <a:rPr lang="en-US" smtClean="0"/>
               <a:t>Fifth level</a:t>
             </a:r>
-            <a:endParaRPr lang="en-US"/>
+            <a:endParaRPr lang="en-US" dirty="0" smtClean="0"/>
           </a:p>
         </p:txBody>
       </p:sp>
@@ -1345,7 +1435,7 @@
           <a:p>
             <a:fld id="{5A87423E-21AC-4CFB-A97C-80CE3F3C4BEE}" type="datetimeFigureOut">
               <a:rPr lang="en-US" smtClean="0"/>
-              <a:t>5/3/2012</a:t>
+              <a:t>5/4/2012</a:t>
             </a:fld>
             <a:endParaRPr lang="en-US"/>
           </a:p>
@@ -1393,12 +1483,64 @@
           </a:p>
         </p:txBody>
       </p:sp>
+      <p:sp>
+        <p:nvSpPr>
+          <p:cNvPr id="9" name="Content Placeholder 8"/>
+          <p:cNvSpPr>
+            <a:spLocks noGrp="1"/>
+          </p:cNvSpPr>
+          <p:nvPr>
+            <p:ph sz="quarter" idx="13"/>
+          </p:nvPr>
+        </p:nvSpPr>
+        <p:spPr>
+          <a:xfrm>
+            <a:off x="365760" y="1600200"/>
+            <a:ext cx="4041648" cy="4526280"/>
+          </a:xfrm>
+        </p:spPr>
+        <p:txBody>
+          <a:bodyPr/>
+          <a:lstStyle/>
+          <a:p>
+            <a:pPr lvl="0"/>
+            <a:r>
+              <a:rPr lang="en-US" smtClean="0"/>
+              <a:t>Click to edit Master text styles</a:t>
+            </a:r>
+          </a:p>
+          <a:p>
+            <a:pPr lvl="1"/>
+            <a:r>
+              <a:rPr lang="en-US" smtClean="0"/>
+              <a:t>Second level</a:t>
+            </a:r>
+          </a:p>
+          <a:p>
+            <a:pPr lvl="2"/>
+            <a:r>
+              <a:rPr lang="en-US" smtClean="0"/>
+              <a:t>Third level</a:t>
+            </a:r>
+          </a:p>
+          <a:p>
+            <a:pPr lvl="3"/>
+            <a:r>
+              <a:rPr lang="en-US" smtClean="0"/>
+              <a:t>Fourth level</a:t>
+            </a:r>
+          </a:p>
+          <a:p>
+            <a:pPr lvl="4"/>
+            <a:r>
+              <a:rPr lang="en-US" smtClean="0"/>
+              <a:t>Fifth level</a:t>
+            </a:r>
+            <a:endParaRPr lang="en-US"/>
+          </a:p>
+        </p:txBody>
+      </p:sp>
     </p:spTree>
-    <p:extLst>
-      <p:ext uri="{BB962C8B-B14F-4D97-AF65-F5344CB8AC3E}">
-        <p14:creationId xmlns:p14="http://schemas.microsoft.com/office/powerpoint/2010/main" val="3941405386"/>
-      </p:ext>
-    </p:extLst>
   </p:cSld>
   <p:clrMapOvr>
     <a:masterClrMapping/>
@@ -1462,16 +1604,18 @@
         </p:nvSpPr>
         <p:spPr>
           <a:xfrm>
-            <a:off x="457200" y="1535113"/>
-            <a:ext cx="4040188" cy="639762"/>
+            <a:off x="457200" y="1600200"/>
+            <a:ext cx="4040188" cy="609600"/>
           </a:xfrm>
         </p:spPr>
         <p:txBody>
-          <a:bodyPr anchor="b"/>
+          <a:bodyPr anchor="b">
+            <a:noAutofit/>
+          </a:bodyPr>
           <a:lstStyle>
-            <a:lvl1pPr marL="0" indent="0">
-              <a:buNone/>
-              <a:defRPr sz="2400" b="1"/>
+            <a:lvl1pPr marL="0" indent="0" algn="ctr">
+              <a:buNone/>
+              <a:defRPr sz="2400" b="0"/>
             </a:lvl1pPr>
             <a:lvl2pPr marL="457200" indent="0">
               <a:buNone/>
@@ -1517,111 +1661,28 @@
       </p:sp>
       <p:sp>
         <p:nvSpPr>
-          <p:cNvPr id="4" name="Content Placeholder 3"/>
-          <p:cNvSpPr>
-            <a:spLocks noGrp="1"/>
-          </p:cNvSpPr>
-          <p:nvPr>
-            <p:ph sz="half" idx="2"/>
+          <p:cNvPr id="5" name="Text Placeholder 4"/>
+          <p:cNvSpPr>
+            <a:spLocks noGrp="1"/>
+          </p:cNvSpPr>
+          <p:nvPr>
+            <p:ph type="body" sz="quarter" idx="3"/>
           </p:nvPr>
         </p:nvSpPr>
         <p:spPr>
           <a:xfrm>
-            <a:off x="457200" y="2174875"/>
-            <a:ext cx="4040188" cy="3951288"/>
+            <a:off x="4648200" y="1600200"/>
+            <a:ext cx="4041775" cy="609600"/>
           </a:xfrm>
         </p:spPr>
         <p:txBody>
-          <a:bodyPr/>
+          <a:bodyPr anchor="b">
+            <a:noAutofit/>
+          </a:bodyPr>
           <a:lstStyle>
-            <a:lvl1pPr>
-              <a:defRPr sz="2400"/>
-            </a:lvl1pPr>
-            <a:lvl2pPr>
-              <a:defRPr sz="2000"/>
-            </a:lvl2pPr>
-            <a:lvl3pPr>
-              <a:defRPr sz="1800"/>
-            </a:lvl3pPr>
-            <a:lvl4pPr>
-              <a:defRPr sz="1600"/>
-            </a:lvl4pPr>
-            <a:lvl5pPr>
-              <a:defRPr sz="1600"/>
-            </a:lvl5pPr>
-            <a:lvl6pPr>
-              <a:defRPr sz="1600"/>
-            </a:lvl6pPr>
-            <a:lvl7pPr>
-              <a:defRPr sz="1600"/>
-            </a:lvl7pPr>
-            <a:lvl8pPr>
-              <a:defRPr sz="1600"/>
-            </a:lvl8pPr>
-            <a:lvl9pPr>
-              <a:defRPr sz="1600"/>
-            </a:lvl9pPr>
-          </a:lstStyle>
-          <a:p>
-            <a:pPr lvl="0"/>
-            <a:r>
-              <a:rPr lang="en-US" smtClean="0"/>
-              <a:t>Click to edit Master text styles</a:t>
-            </a:r>
-          </a:p>
-          <a:p>
-            <a:pPr lvl="1"/>
-            <a:r>
-              <a:rPr lang="en-US" smtClean="0"/>
-              <a:t>Second level</a:t>
-            </a:r>
-          </a:p>
-          <a:p>
-            <a:pPr lvl="2"/>
-            <a:r>
-              <a:rPr lang="en-US" smtClean="0"/>
-              <a:t>Third level</a:t>
-            </a:r>
-          </a:p>
-          <a:p>
-            <a:pPr lvl="3"/>
-            <a:r>
-              <a:rPr lang="en-US" smtClean="0"/>
-              <a:t>Fourth level</a:t>
-            </a:r>
-          </a:p>
-          <a:p>
-            <a:pPr lvl="4"/>
-            <a:r>
-              <a:rPr lang="en-US" smtClean="0"/>
-              <a:t>Fifth level</a:t>
-            </a:r>
-            <a:endParaRPr lang="en-US"/>
-          </a:p>
-        </p:txBody>
-      </p:sp>
-      <p:sp>
-        <p:nvSpPr>
-          <p:cNvPr id="5" name="Text Placeholder 4"/>
-          <p:cNvSpPr>
-            <a:spLocks noGrp="1"/>
-          </p:cNvSpPr>
-          <p:nvPr>
-            <p:ph type="body" sz="quarter" idx="3"/>
-          </p:nvPr>
-        </p:nvSpPr>
-        <p:spPr>
-          <a:xfrm>
-            <a:off x="4645025" y="1535113"/>
-            <a:ext cx="4041775" cy="639762"/>
-          </a:xfrm>
-        </p:spPr>
-        <p:txBody>
-          <a:bodyPr anchor="b"/>
-          <a:lstStyle>
-            <a:lvl1pPr marL="0" indent="0">
-              <a:buNone/>
-              <a:defRPr sz="2400" b="1"/>
+            <a:lvl1pPr marL="0" indent="0" algn="ctr">
+              <a:buNone/>
+              <a:defRPr sz="2400" b="0"/>
             </a:lvl1pPr>
             <a:lvl2pPr marL="457200" indent="0">
               <a:buNone/>
@@ -1667,51 +1728,88 @@
       </p:sp>
       <p:sp>
         <p:nvSpPr>
-          <p:cNvPr id="6" name="Content Placeholder 5"/>
-          <p:cNvSpPr>
-            <a:spLocks noGrp="1"/>
-          </p:cNvSpPr>
-          <p:nvPr>
-            <p:ph sz="quarter" idx="4"/>
+          <p:cNvPr id="7" name="Date Placeholder 6"/>
+          <p:cNvSpPr>
+            <a:spLocks noGrp="1"/>
+          </p:cNvSpPr>
+          <p:nvPr>
+            <p:ph type="dt" sz="half" idx="10"/>
+          </p:nvPr>
+        </p:nvSpPr>
+        <p:spPr/>
+        <p:txBody>
+          <a:bodyPr/>
+          <a:lstStyle/>
+          <a:p>
+            <a:fld id="{5A87423E-21AC-4CFB-A97C-80CE3F3C4BEE}" type="datetimeFigureOut">
+              <a:rPr lang="en-US" smtClean="0"/>
+              <a:t>5/4/2012</a:t>
+            </a:fld>
+            <a:endParaRPr lang="en-US"/>
+          </a:p>
+        </p:txBody>
+      </p:sp>
+      <p:sp>
+        <p:nvSpPr>
+          <p:cNvPr id="8" name="Footer Placeholder 7"/>
+          <p:cNvSpPr>
+            <a:spLocks noGrp="1"/>
+          </p:cNvSpPr>
+          <p:nvPr>
+            <p:ph type="ftr" sz="quarter" idx="11"/>
+          </p:nvPr>
+        </p:nvSpPr>
+        <p:spPr/>
+        <p:txBody>
+          <a:bodyPr/>
+          <a:lstStyle/>
+          <a:p>
+            <a:endParaRPr lang="en-US"/>
+          </a:p>
+        </p:txBody>
+      </p:sp>
+      <p:sp>
+        <p:nvSpPr>
+          <p:cNvPr id="9" name="Slide Number Placeholder 8"/>
+          <p:cNvSpPr>
+            <a:spLocks noGrp="1"/>
+          </p:cNvSpPr>
+          <p:nvPr>
+            <p:ph type="sldNum" sz="quarter" idx="12"/>
+          </p:nvPr>
+        </p:nvSpPr>
+        <p:spPr/>
+        <p:txBody>
+          <a:bodyPr/>
+          <a:lstStyle/>
+          <a:p>
+            <a:fld id="{D2479589-09D0-4BC6-8373-4D4F1131DC5D}" type="slidenum">
+              <a:rPr lang="en-US" smtClean="0"/>
+              <a:t>‹#›</a:t>
+            </a:fld>
+            <a:endParaRPr lang="en-US"/>
+          </a:p>
+        </p:txBody>
+      </p:sp>
+      <p:sp>
+        <p:nvSpPr>
+          <p:cNvPr id="11" name="Content Placeholder 10"/>
+          <p:cNvSpPr>
+            <a:spLocks noGrp="1"/>
+          </p:cNvSpPr>
+          <p:nvPr>
+            <p:ph sz="quarter" idx="13"/>
           </p:nvPr>
         </p:nvSpPr>
         <p:spPr>
           <a:xfrm>
-            <a:off x="4645025" y="2174875"/>
-            <a:ext cx="4041775" cy="3951288"/>
+            <a:off x="457200" y="2212848"/>
+            <a:ext cx="4041648" cy="3913632"/>
           </a:xfrm>
         </p:spPr>
         <p:txBody>
           <a:bodyPr/>
-          <a:lstStyle>
-            <a:lvl1pPr>
-              <a:defRPr sz="2400"/>
-            </a:lvl1pPr>
-            <a:lvl2pPr>
-              <a:defRPr sz="2000"/>
-            </a:lvl2pPr>
-            <a:lvl3pPr>
-              <a:defRPr sz="1800"/>
-            </a:lvl3pPr>
-            <a:lvl4pPr>
-              <a:defRPr sz="1600"/>
-            </a:lvl4pPr>
-            <a:lvl5pPr>
-              <a:defRPr sz="1600"/>
-            </a:lvl5pPr>
-            <a:lvl6pPr>
-              <a:defRPr sz="1600"/>
-            </a:lvl6pPr>
-            <a:lvl7pPr>
-              <a:defRPr sz="1600"/>
-            </a:lvl7pPr>
-            <a:lvl8pPr>
-              <a:defRPr sz="1600"/>
-            </a:lvl8pPr>
-            <a:lvl9pPr>
-              <a:defRPr sz="1600"/>
-            </a:lvl9pPr>
-          </a:lstStyle>
+          <a:lstStyle/>
           <a:p>
             <a:pPr lvl="0"/>
             <a:r>
@@ -1746,81 +1844,68 @@
               <a:rPr lang="en-US" smtClean="0"/>
               <a:t>Fifth level</a:t>
             </a:r>
-            <a:endParaRPr lang="en-US"/>
-          </a:p>
-        </p:txBody>
-      </p:sp>
-      <p:sp>
-        <p:nvSpPr>
-          <p:cNvPr id="7" name="Date Placeholder 6"/>
-          <p:cNvSpPr>
-            <a:spLocks noGrp="1"/>
-          </p:cNvSpPr>
-          <p:nvPr>
-            <p:ph type="dt" sz="half" idx="10"/>
-          </p:nvPr>
-        </p:nvSpPr>
-        <p:spPr/>
-        <p:txBody>
-          <a:bodyPr/>
-          <a:lstStyle/>
-          <a:p>
-            <a:fld id="{5A87423E-21AC-4CFB-A97C-80CE3F3C4BEE}" type="datetimeFigureOut">
-              <a:rPr lang="en-US" smtClean="0"/>
-              <a:t>5/3/2012</a:t>
-            </a:fld>
-            <a:endParaRPr lang="en-US"/>
-          </a:p>
-        </p:txBody>
-      </p:sp>
-      <p:sp>
-        <p:nvSpPr>
-          <p:cNvPr id="8" name="Footer Placeholder 7"/>
-          <p:cNvSpPr>
-            <a:spLocks noGrp="1"/>
-          </p:cNvSpPr>
-          <p:nvPr>
-            <p:ph type="ftr" sz="quarter" idx="11"/>
-          </p:nvPr>
-        </p:nvSpPr>
-        <p:spPr/>
-        <p:txBody>
-          <a:bodyPr/>
-          <a:lstStyle/>
-          <a:p>
-            <a:endParaRPr lang="en-US"/>
-          </a:p>
-        </p:txBody>
-      </p:sp>
-      <p:sp>
-        <p:nvSpPr>
-          <p:cNvPr id="9" name="Slide Number Placeholder 8"/>
-          <p:cNvSpPr>
-            <a:spLocks noGrp="1"/>
-          </p:cNvSpPr>
-          <p:nvPr>
-            <p:ph type="sldNum" sz="quarter" idx="12"/>
-          </p:nvPr>
-        </p:nvSpPr>
-        <p:spPr/>
-        <p:txBody>
-          <a:bodyPr/>
-          <a:lstStyle/>
-          <a:p>
-            <a:fld id="{D2479589-09D0-4BC6-8373-4D4F1131DC5D}" type="slidenum">
-              <a:rPr lang="en-US" smtClean="0"/>
-              <a:t>‹#›</a:t>
-            </a:fld>
-            <a:endParaRPr lang="en-US"/>
+            <a:endParaRPr lang="en-US" dirty="0"/>
+          </a:p>
+        </p:txBody>
+      </p:sp>
+      <p:sp>
+        <p:nvSpPr>
+          <p:cNvPr id="13" name="Content Placeholder 12"/>
+          <p:cNvSpPr>
+            <a:spLocks noGrp="1"/>
+          </p:cNvSpPr>
+          <p:nvPr>
+            <p:ph sz="quarter" idx="14"/>
+          </p:nvPr>
+        </p:nvSpPr>
+        <p:spPr>
+          <a:xfrm>
+            <a:off x="4672584" y="2212848"/>
+            <a:ext cx="4041648" cy="3913187"/>
+          </a:xfrm>
+        </p:spPr>
+        <p:txBody>
+          <a:bodyPr/>
+          <a:lstStyle/>
+          <a:p>
+            <a:pPr lvl="0"/>
+            <a:r>
+              <a:rPr lang="en-US" smtClean="0"/>
+              <a:t>Click to edit Master text styles</a:t>
+            </a:r>
+          </a:p>
+          <a:p>
+            <a:pPr lvl="1"/>
+            <a:r>
+              <a:rPr lang="en-US" smtClean="0"/>
+              <a:t>Second level</a:t>
+            </a:r>
+          </a:p>
+          <a:p>
+            <a:pPr lvl="2"/>
+            <a:r>
+              <a:rPr lang="en-US" smtClean="0"/>
+              <a:t>Third level</a:t>
+            </a:r>
+          </a:p>
+          <a:p>
+            <a:pPr lvl="3"/>
+            <a:r>
+              <a:rPr lang="en-US" smtClean="0"/>
+              <a:t>Fourth level</a:t>
+            </a:r>
+          </a:p>
+          <a:p>
+            <a:pPr lvl="4"/>
+            <a:r>
+              <a:rPr lang="en-US" smtClean="0"/>
+              <a:t>Fifth level</a:t>
+            </a:r>
+            <a:endParaRPr lang="en-US" dirty="0"/>
           </a:p>
         </p:txBody>
       </p:sp>
     </p:spTree>
-    <p:extLst>
-      <p:ext uri="{BB962C8B-B14F-4D97-AF65-F5344CB8AC3E}">
-        <p14:creationId xmlns:p14="http://schemas.microsoft.com/office/powerpoint/2010/main" val="3787551557"/>
-      </p:ext>
-    </p:extLst>
   </p:cSld>
   <p:clrMapOvr>
     <a:masterClrMapping/>
@@ -1864,7 +1949,7 @@
               <a:rPr lang="en-US" smtClean="0"/>
               <a:t>Click to edit Master title style</a:t>
             </a:r>
-            <a:endParaRPr lang="en-US"/>
+            <a:endParaRPr lang="en-US" dirty="0"/>
           </a:p>
         </p:txBody>
       </p:sp>
@@ -1885,7 +1970,7 @@
           <a:p>
             <a:fld id="{5A87423E-21AC-4CFB-A97C-80CE3F3C4BEE}" type="datetimeFigureOut">
               <a:rPr lang="en-US" smtClean="0"/>
-              <a:t>5/3/2012</a:t>
+              <a:t>5/4/2012</a:t>
             </a:fld>
             <a:endParaRPr lang="en-US"/>
           </a:p>
@@ -1934,11 +2019,6 @@
         </p:txBody>
       </p:sp>
     </p:spTree>
-    <p:extLst>
-      <p:ext uri="{BB962C8B-B14F-4D97-AF65-F5344CB8AC3E}">
-        <p14:creationId xmlns:p14="http://schemas.microsoft.com/office/powerpoint/2010/main" val="218007808"/>
-      </p:ext>
-    </p:extLst>
   </p:cSld>
   <p:clrMapOvr>
     <a:masterClrMapping/>
@@ -1980,7 +2060,7 @@
           <a:p>
             <a:fld id="{5A87423E-21AC-4CFB-A97C-80CE3F3C4BEE}" type="datetimeFigureOut">
               <a:rPr lang="en-US" smtClean="0"/>
-              <a:t>5/3/2012</a:t>
+              <a:t>5/4/2012</a:t>
             </a:fld>
             <a:endParaRPr lang="en-US"/>
           </a:p>
@@ -2029,11 +2109,6 @@
         </p:txBody>
       </p:sp>
     </p:spTree>
-    <p:extLst>
-      <p:ext uri="{BB962C8B-B14F-4D97-AF65-F5344CB8AC3E}">
-        <p14:creationId xmlns:p14="http://schemas.microsoft.com/office/powerpoint/2010/main" val="1240352148"/>
-      </p:ext>
-    </p:extLst>
   </p:cSld>
   <p:clrMapOvr>
     <a:masterClrMapping/>
@@ -2070,15 +2145,26 @@
         </p:nvSpPr>
         <p:spPr>
           <a:xfrm>
-            <a:off x="457200" y="273050"/>
-            <a:ext cx="3008313" cy="1162050"/>
+            <a:off x="5907087" y="266700"/>
+            <a:ext cx="3008313" cy="2095500"/>
           </a:xfrm>
         </p:spPr>
         <p:txBody>
           <a:bodyPr anchor="b"/>
           <a:lstStyle>
-            <a:lvl1pPr algn="l">
-              <a:defRPr sz="2000" b="1"/>
+            <a:lvl1pPr algn="ctr">
+              <a:lnSpc>
+                <a:spcPct val="100000"/>
+              </a:lnSpc>
+              <a:defRPr sz="2800" b="0">
+                <a:effectLst>
+                  <a:outerShdw blurRad="50800" dist="25400" dir="5400000" algn="t" rotWithShape="0">
+                    <a:prstClr val="black">
+                      <a:alpha val="25000"/>
+                    </a:prstClr>
+                  </a:outerShdw>
+                </a:effectLst>
+              </a:defRPr>
             </a:lvl1pPr>
           </a:lstStyle>
           <a:p>
@@ -2086,7 +2172,7 @@
               <a:rPr lang="en-US" smtClean="0"/>
               <a:t>Click to edit Master title style</a:t>
             </a:r>
-            <a:endParaRPr lang="en-US"/>
+            <a:endParaRPr lang="en-US" dirty="0"/>
           </a:p>
         </p:txBody>
       </p:sp>
@@ -2102,8 +2188,8 @@
         </p:nvSpPr>
         <p:spPr>
           <a:xfrm>
-            <a:off x="3575050" y="273050"/>
-            <a:ext cx="5111750" cy="5853113"/>
+            <a:off x="719137" y="273050"/>
+            <a:ext cx="4995863" cy="5853113"/>
           </a:xfrm>
         </p:spPr>
         <p:txBody>
@@ -2171,7 +2257,7 @@
               <a:rPr lang="en-US" smtClean="0"/>
               <a:t>Fifth level</a:t>
             </a:r>
-            <a:endParaRPr lang="en-US"/>
+            <a:endParaRPr lang="en-US" dirty="0"/>
           </a:p>
         </p:txBody>
       </p:sp>
@@ -2187,16 +2273,21 @@
         </p:nvSpPr>
         <p:spPr>
           <a:xfrm>
-            <a:off x="457200" y="1435100"/>
-            <a:ext cx="3008313" cy="4691063"/>
+            <a:off x="5907087" y="2438400"/>
+            <a:ext cx="3008313" cy="3687763"/>
           </a:xfrm>
         </p:spPr>
         <p:txBody>
-          <a:bodyPr/>
+          <a:bodyPr>
+            <a:normAutofit/>
+          </a:bodyPr>
           <a:lstStyle>
-            <a:lvl1pPr marL="0" indent="0">
-              <a:buNone/>
-              <a:defRPr sz="1400"/>
+            <a:lvl1pPr marL="0" indent="0" algn="ctr">
+              <a:lnSpc>
+                <a:spcPct val="125000"/>
+              </a:lnSpc>
+              <a:buNone/>
+              <a:defRPr sz="1600"/>
             </a:lvl1pPr>
             <a:lvl2pPr marL="457200" indent="0">
               <a:buNone/>
@@ -2257,7 +2348,7 @@
           <a:p>
             <a:fld id="{5A87423E-21AC-4CFB-A97C-80CE3F3C4BEE}" type="datetimeFigureOut">
               <a:rPr lang="en-US" smtClean="0"/>
-              <a:t>5/3/2012</a:t>
+              <a:t>5/4/2012</a:t>
             </a:fld>
             <a:endParaRPr lang="en-US"/>
           </a:p>
@@ -2306,11 +2397,6 @@
         </p:txBody>
       </p:sp>
     </p:spTree>
-    <p:extLst>
-      <p:ext uri="{BB962C8B-B14F-4D97-AF65-F5344CB8AC3E}">
-        <p14:creationId xmlns:p14="http://schemas.microsoft.com/office/powerpoint/2010/main" val="2681615029"/>
-      </p:ext>
-    </p:extLst>
   </p:cSld>
   <p:clrMapOvr>
     <a:masterClrMapping/>
@@ -2347,15 +2433,18 @@
         </p:nvSpPr>
         <p:spPr>
           <a:xfrm>
-            <a:off x="1792288" y="4800600"/>
-            <a:ext cx="5486400" cy="566738"/>
+            <a:off x="1679576" y="228600"/>
+            <a:ext cx="5711824" cy="895350"/>
           </a:xfrm>
         </p:spPr>
         <p:txBody>
           <a:bodyPr anchor="b"/>
           <a:lstStyle>
-            <a:lvl1pPr algn="l">
-              <a:defRPr sz="2000" b="1"/>
+            <a:lvl1pPr algn="ctr">
+              <a:lnSpc>
+                <a:spcPct val="100000"/>
+              </a:lnSpc>
+              <a:defRPr sz="2800" b="0"/>
             </a:lvl1pPr>
           </a:lstStyle>
           <a:p>
@@ -2363,7 +2452,7 @@
               <a:rPr lang="en-US" smtClean="0"/>
               <a:t>Click to edit Master title style</a:t>
             </a:r>
-            <a:endParaRPr lang="en-US"/>
+            <a:endParaRPr lang="en-US" dirty="0"/>
           </a:p>
         </p:txBody>
       </p:sp>
@@ -2379,14 +2468,26 @@
         </p:nvSpPr>
         <p:spPr>
           <a:xfrm>
-            <a:off x="1792288" y="612775"/>
-            <a:ext cx="5486400" cy="4114800"/>
+            <a:off x="1508126" y="1143000"/>
+            <a:ext cx="6054724" cy="4541044"/>
           </a:xfrm>
+          <a:ln w="76200">
+            <a:solidFill>
+              <a:schemeClr val="bg1"/>
+            </a:solidFill>
+          </a:ln>
+          <a:effectLst>
+            <a:outerShdw blurRad="88900" dist="50800" dir="5400000" algn="ctr" rotWithShape="0">
+              <a:srgbClr val="000000">
+                <a:alpha val="25000"/>
+              </a:srgbClr>
+            </a:outerShdw>
+          </a:effectLst>
         </p:spPr>
         <p:txBody>
-          <a:bodyPr/>
+          <a:bodyPr anchor="t"/>
           <a:lstStyle>
-            <a:lvl1pPr marL="0" indent="0">
+            <a:lvl1pPr marL="0" indent="0" algn="ctr">
               <a:buNone/>
               <a:defRPr sz="3200"/>
             </a:lvl1pPr>
@@ -2424,7 +2525,11 @@
             </a:lvl9pPr>
           </a:lstStyle>
           <a:p>
-            <a:endParaRPr lang="en-US"/>
+            <a:r>
+              <a:rPr lang="en-US" smtClean="0"/>
+              <a:t>Click icon to add picture</a:t>
+            </a:r>
+            <a:endParaRPr lang="en-US" dirty="0"/>
           </a:p>
         </p:txBody>
       </p:sp>
@@ -2440,16 +2545,18 @@
         </p:nvSpPr>
         <p:spPr>
           <a:xfrm>
-            <a:off x="1792288" y="5367338"/>
-            <a:ext cx="5486400" cy="804862"/>
+            <a:off x="1679576" y="5810250"/>
+            <a:ext cx="5711824" cy="533400"/>
           </a:xfrm>
         </p:spPr>
         <p:txBody>
-          <a:bodyPr/>
+          <a:bodyPr>
+            <a:normAutofit/>
+          </a:bodyPr>
           <a:lstStyle>
-            <a:lvl1pPr marL="0" indent="0">
-              <a:buNone/>
-              <a:defRPr sz="1400"/>
+            <a:lvl1pPr marL="0" indent="0" algn="ctr">
+              <a:buNone/>
+              <a:defRPr sz="1600"/>
             </a:lvl1pPr>
             <a:lvl2pPr marL="457200" indent="0">
               <a:buNone/>
@@ -2510,7 +2617,7 @@
           <a:p>
             <a:fld id="{5A87423E-21AC-4CFB-A97C-80CE3F3C4BEE}" type="datetimeFigureOut">
               <a:rPr lang="en-US" smtClean="0"/>
-              <a:t>5/3/2012</a:t>
+              <a:t>5/4/2012</a:t>
             </a:fld>
             <a:endParaRPr lang="en-US"/>
           </a:p>
@@ -2559,11 +2666,6 @@
         </p:txBody>
       </p:sp>
     </p:spTree>
-    <p:extLst>
-      <p:ext uri="{BB962C8B-B14F-4D97-AF65-F5344CB8AC3E}">
-        <p14:creationId xmlns:p14="http://schemas.microsoft.com/office/powerpoint/2010/main" val="1915427673"/>
-      </p:ext>
-    </p:extLst>
   </p:cSld>
   <p:clrMapOvr>
     <a:masterClrMapping/>
@@ -2575,7 +2677,7 @@
 <p:sldMaster xmlns:a="http://schemas.openxmlformats.org/drawingml/2006/main" xmlns:r="http://schemas.openxmlformats.org/officeDocument/2006/relationships" xmlns:p="http://schemas.openxmlformats.org/presentationml/2006/main">
   <p:cSld>
     <p:bg>
-      <p:bgRef idx="1001">
+      <p:bgRef idx="1002">
         <a:schemeClr val="bg1"/>
       </p:bgRef>
     </p:bg>
@@ -2605,16 +2707,16 @@
         </p:nvSpPr>
         <p:spPr>
           <a:xfrm>
-            <a:off x="457200" y="274638"/>
-            <a:ext cx="8229600" cy="1143000"/>
+            <a:off x="457200" y="0"/>
+            <a:ext cx="8229600" cy="1600200"/>
           </a:xfrm>
           <a:prstGeom prst="rect">
             <a:avLst/>
           </a:prstGeom>
         </p:spPr>
         <p:txBody>
-          <a:bodyPr vert="horz" lIns="91440" tIns="45720" rIns="91440" bIns="45720" rtlCol="0" anchor="ctr">
-            <a:normAutofit/>
+          <a:bodyPr vert="horz" lIns="91440" tIns="45720" rIns="91440" bIns="45720" rtlCol="0" anchor="b">
+            <a:noAutofit/>
           </a:bodyPr>
           <a:lstStyle/>
           <a:p>
@@ -2622,7 +2724,7 @@
               <a:rPr lang="en-US" smtClean="0"/>
               <a:t>Click to edit Master title style</a:t>
             </a:r>
-            <a:endParaRPr lang="en-US"/>
+            <a:endParaRPr lang="en-US" dirty="0"/>
           </a:p>
         </p:txBody>
       </p:sp>
@@ -2684,7 +2786,7 @@
               <a:rPr lang="en-US" smtClean="0"/>
               <a:t>Fifth level</a:t>
             </a:r>
-            <a:endParaRPr lang="en-US"/>
+            <a:endParaRPr lang="en-US" dirty="0" smtClean="0"/>
           </a:p>
         </p:txBody>
       </p:sp>
@@ -2700,146 +2802,264 @@
         </p:nvSpPr>
         <p:spPr>
           <a:xfrm>
-            <a:off x="457200" y="6356350"/>
-            <a:ext cx="2133600" cy="365125"/>
+            <a:off x="6363347" y="6356350"/>
+            <a:ext cx="2085975" cy="365125"/>
           </a:xfrm>
           <a:prstGeom prst="rect">
             <a:avLst/>
           </a:prstGeom>
         </p:spPr>
         <p:txBody>
-          <a:bodyPr vert="horz" lIns="91440" tIns="45720" rIns="91440" bIns="45720" rtlCol="0" anchor="ctr"/>
+          <a:bodyPr vert="horz" lIns="91440" tIns="45720" rIns="45720" bIns="45720" rtlCol="0" anchor="ctr"/>
+          <a:lstStyle>
+            <a:lvl1pPr algn="r">
+              <a:defRPr sz="1200">
+                <a:solidFill>
+                  <a:schemeClr val="tx1">
+                    <a:lumMod val="65000"/>
+                    <a:lumOff val="35000"/>
+                  </a:schemeClr>
+                </a:solidFill>
+                <a:latin typeface="Century Gothic" pitchFamily="34" charset="0"/>
+              </a:defRPr>
+            </a:lvl1pPr>
+          </a:lstStyle>
+          <a:p>
+            <a:fld id="{5A87423E-21AC-4CFB-A97C-80CE3F3C4BEE}" type="datetimeFigureOut">
+              <a:rPr lang="en-US" smtClean="0"/>
+              <a:t>5/4/2012</a:t>
+            </a:fld>
+            <a:endParaRPr lang="en-US"/>
+          </a:p>
+        </p:txBody>
+      </p:sp>
+      <p:sp>
+        <p:nvSpPr>
+          <p:cNvPr id="5" name="Footer Placeholder 4"/>
+          <p:cNvSpPr>
+            <a:spLocks noGrp="1"/>
+          </p:cNvSpPr>
+          <p:nvPr>
+            <p:ph type="ftr" sz="quarter" idx="3"/>
+          </p:nvPr>
+        </p:nvSpPr>
+        <p:spPr>
+          <a:xfrm>
+            <a:off x="659165" y="6356350"/>
+            <a:ext cx="2847975" cy="365125"/>
+          </a:xfrm>
+          <a:prstGeom prst="rect">
+            <a:avLst/>
+          </a:prstGeom>
+        </p:spPr>
+        <p:txBody>
+          <a:bodyPr vert="horz" lIns="45720" tIns="45720" rIns="91440" bIns="45720" rtlCol="0" anchor="ctr"/>
           <a:lstStyle>
             <a:lvl1pPr algn="l">
               <a:defRPr sz="1200">
                 <a:solidFill>
                   <a:schemeClr val="tx1">
-                    <a:tint val="75000"/>
+                    <a:lumMod val="65000"/>
+                    <a:lumOff val="35000"/>
                   </a:schemeClr>
                 </a:solidFill>
+                <a:latin typeface="Century Gothic" pitchFamily="34" charset="0"/>
               </a:defRPr>
             </a:lvl1pPr>
           </a:lstStyle>
           <a:p>
-            <a:fld id="{5A87423E-21AC-4CFB-A97C-80CE3F3C4BEE}" type="datetimeFigureOut">
-              <a:rPr lang="en-US" smtClean="0"/>
-              <a:t>5/3/2012</a:t>
-            </a:fld>
-            <a:endParaRPr lang="en-US"/>
-          </a:p>
-        </p:txBody>
-      </p:sp>
-      <p:sp>
-        <p:nvSpPr>
-          <p:cNvPr id="5" name="Footer Placeholder 4"/>
-          <p:cNvSpPr>
-            <a:spLocks noGrp="1"/>
-          </p:cNvSpPr>
-          <p:nvPr>
-            <p:ph type="ftr" sz="quarter" idx="3"/>
+            <a:endParaRPr lang="en-US"/>
+          </a:p>
+        </p:txBody>
+      </p:sp>
+      <p:sp>
+        <p:nvSpPr>
+          <p:cNvPr id="6" name="Slide Number Placeholder 5"/>
+          <p:cNvSpPr>
+            <a:spLocks noGrp="1"/>
+          </p:cNvSpPr>
+          <p:nvPr>
+            <p:ph type="sldNum" sz="quarter" idx="4"/>
           </p:nvPr>
         </p:nvSpPr>
         <p:spPr>
           <a:xfrm>
-            <a:off x="3124200" y="6356350"/>
-            <a:ext cx="2895600" cy="365125"/>
+            <a:off x="8543278" y="6356350"/>
+            <a:ext cx="561975" cy="365125"/>
           </a:xfrm>
           <a:prstGeom prst="rect">
             <a:avLst/>
           </a:prstGeom>
         </p:spPr>
         <p:txBody>
-          <a:bodyPr vert="horz" lIns="91440" tIns="45720" rIns="91440" bIns="45720" rtlCol="0" anchor="ctr"/>
+          <a:bodyPr vert="horz" lIns="27432" tIns="45720" rIns="45720" bIns="45720" rtlCol="0" anchor="ctr"/>
           <a:lstStyle>
-            <a:lvl1pPr algn="ctr">
+            <a:lvl1pPr algn="l">
               <a:defRPr sz="1200">
                 <a:solidFill>
                   <a:schemeClr val="tx1">
-                    <a:tint val="75000"/>
+                    <a:lumMod val="65000"/>
+                    <a:lumOff val="35000"/>
                   </a:schemeClr>
                 </a:solidFill>
+                <a:latin typeface="Century Gothic" pitchFamily="34" charset="0"/>
               </a:defRPr>
             </a:lvl1pPr>
           </a:lstStyle>
           <a:p>
-            <a:endParaRPr lang="en-US"/>
-          </a:p>
-        </p:txBody>
-      </p:sp>
-      <p:sp>
-        <p:nvSpPr>
-          <p:cNvPr id="6" name="Slide Number Placeholder 5"/>
-          <p:cNvSpPr>
-            <a:spLocks noGrp="1"/>
-          </p:cNvSpPr>
-          <p:nvPr>
-            <p:ph type="sldNum" sz="quarter" idx="4"/>
-          </p:nvPr>
+            <a:fld id="{D2479589-09D0-4BC6-8373-4D4F1131DC5D}" type="slidenum">
+              <a:rPr lang="en-US" smtClean="0"/>
+              <a:t>‹#›</a:t>
+            </a:fld>
+            <a:endParaRPr lang="en-US"/>
+          </a:p>
+        </p:txBody>
+      </p:sp>
+      <p:sp>
+        <p:nvSpPr>
+          <p:cNvPr id="7" name="Oval 6"/>
+          <p:cNvSpPr/>
+          <p:nvPr/>
         </p:nvSpPr>
         <p:spPr>
           <a:xfrm>
-            <a:off x="6553200" y="6356350"/>
-            <a:ext cx="2133600" cy="365125"/>
+            <a:off x="8457760" y="6499384"/>
+            <a:ext cx="84772" cy="84772"/>
           </a:xfrm>
-          <a:prstGeom prst="rect">
+          <a:prstGeom prst="ellipse">
             <a:avLst/>
           </a:prstGeom>
+          <a:solidFill>
+            <a:schemeClr val="tx1">
+              <a:lumMod val="50000"/>
+              <a:lumOff val="50000"/>
+            </a:schemeClr>
+          </a:solidFill>
+          <a:ln w="12700">
+            <a:noFill/>
+          </a:ln>
+          <a:effectLst/>
         </p:spPr>
-        <p:txBody>
-          <a:bodyPr vert="horz" lIns="91440" tIns="45720" rIns="91440" bIns="45720" rtlCol="0" anchor="ctr"/>
-          <a:lstStyle>
-            <a:lvl1pPr algn="r">
-              <a:defRPr sz="1200">
-                <a:solidFill>
-                  <a:schemeClr val="tx1">
-                    <a:tint val="75000"/>
-                  </a:schemeClr>
-                </a:solidFill>
-              </a:defRPr>
-            </a:lvl1pPr>
-          </a:lstStyle>
-          <a:p>
-            <a:fld id="{D2479589-09D0-4BC6-8373-4D4F1131DC5D}" type="slidenum">
-              <a:rPr lang="en-US" smtClean="0"/>
-              <a:t>‹#›</a:t>
-            </a:fld>
+        <p:style>
+          <a:lnRef idx="2">
+            <a:schemeClr val="accent1">
+              <a:shade val="50000"/>
+            </a:schemeClr>
+          </a:lnRef>
+          <a:fillRef idx="1">
+            <a:schemeClr val="accent1"/>
+          </a:fillRef>
+          <a:effectRef idx="0">
+            <a:schemeClr val="accent1"/>
+          </a:effectRef>
+          <a:fontRef idx="minor">
+            <a:schemeClr val="lt1"/>
+          </a:fontRef>
+        </p:style>
+        <p:txBody>
+          <a:bodyPr rtlCol="0" anchor="ctr"/>
+          <a:lstStyle/>
+          <a:p>
+            <a:pPr marL="0" algn="ctr" defTabSz="914400" rtl="0" eaLnBrk="1" latinLnBrk="0" hangingPunct="1"/>
+            <a:endParaRPr lang="en-US" sz="1800" kern="1200">
+              <a:solidFill>
+                <a:schemeClr val="lt1"/>
+              </a:solidFill>
+              <a:latin typeface="+mn-lt"/>
+              <a:ea typeface="+mn-ea"/>
+              <a:cs typeface="+mn-cs"/>
+            </a:endParaRPr>
+          </a:p>
+        </p:txBody>
+      </p:sp>
+      <p:sp>
+        <p:nvSpPr>
+          <p:cNvPr id="8" name="Oval 7"/>
+          <p:cNvSpPr/>
+          <p:nvPr/>
+        </p:nvSpPr>
+        <p:spPr>
+          <a:xfrm>
+            <a:off x="569119" y="6499384"/>
+            <a:ext cx="84772" cy="84772"/>
+          </a:xfrm>
+          <a:prstGeom prst="ellipse">
+            <a:avLst/>
+          </a:prstGeom>
+          <a:solidFill>
+            <a:schemeClr val="tx1">
+              <a:lumMod val="50000"/>
+              <a:lumOff val="50000"/>
+            </a:schemeClr>
+          </a:solidFill>
+          <a:ln w="12700">
+            <a:noFill/>
+          </a:ln>
+          <a:effectLst/>
+        </p:spPr>
+        <p:style>
+          <a:lnRef idx="2">
+            <a:schemeClr val="accent1">
+              <a:shade val="50000"/>
+            </a:schemeClr>
+          </a:lnRef>
+          <a:fillRef idx="1">
+            <a:schemeClr val="accent1"/>
+          </a:fillRef>
+          <a:effectRef idx="0">
+            <a:schemeClr val="accent1"/>
+          </a:effectRef>
+          <a:fontRef idx="minor">
+            <a:schemeClr val="lt1"/>
+          </a:fontRef>
+        </p:style>
+        <p:txBody>
+          <a:bodyPr rtlCol="0" anchor="ctr"/>
+          <a:lstStyle/>
+          <a:p>
+            <a:pPr algn="ctr"/>
             <a:endParaRPr lang="en-US"/>
           </a:p>
         </p:txBody>
       </p:sp>
     </p:spTree>
-    <p:extLst>
-      <p:ext uri="{BB962C8B-B14F-4D97-AF65-F5344CB8AC3E}">
-        <p14:creationId xmlns:p14="http://schemas.microsoft.com/office/powerpoint/2010/main" val="345954758"/>
-      </p:ext>
-    </p:extLst>
   </p:cSld>
   <p:clrMap bg1="lt1" tx1="dk1" bg2="lt2" tx2="dk2" accent1="accent1" accent2="accent2" accent3="accent3" accent4="accent4" accent5="accent5" accent6="accent6" hlink="hlink" folHlink="folHlink"/>
   <p:sldLayoutIdLst>
-    <p:sldLayoutId id="2147483649" r:id="rId1"/>
-    <p:sldLayoutId id="2147483650" r:id="rId2"/>
-    <p:sldLayoutId id="2147483651" r:id="rId3"/>
-    <p:sldLayoutId id="2147483652" r:id="rId4"/>
-    <p:sldLayoutId id="2147483653" r:id="rId5"/>
-    <p:sldLayoutId id="2147483654" r:id="rId6"/>
-    <p:sldLayoutId id="2147483655" r:id="rId7"/>
-    <p:sldLayoutId id="2147483656" r:id="rId8"/>
-    <p:sldLayoutId id="2147483657" r:id="rId9"/>
-    <p:sldLayoutId id="2147483658" r:id="rId10"/>
-    <p:sldLayoutId id="2147483659" r:id="rId11"/>
+    <p:sldLayoutId id="2147483721" r:id="rId1"/>
+    <p:sldLayoutId id="2147483722" r:id="rId2"/>
+    <p:sldLayoutId id="2147483723" r:id="rId3"/>
+    <p:sldLayoutId id="2147483724" r:id="rId4"/>
+    <p:sldLayoutId id="2147483725" r:id="rId5"/>
+    <p:sldLayoutId id="2147483726" r:id="rId6"/>
+    <p:sldLayoutId id="2147483727" r:id="rId7"/>
+    <p:sldLayoutId id="2147483728" r:id="rId8"/>
+    <p:sldLayoutId id="2147483729" r:id="rId9"/>
+    <p:sldLayoutId id="2147483730" r:id="rId10"/>
+    <p:sldLayoutId id="2147483731" r:id="rId11"/>
   </p:sldLayoutIdLst>
   <p:txStyles>
     <p:titleStyle>
       <a:lvl1pPr algn="ctr" defTabSz="914400" rtl="0" eaLnBrk="1" latinLnBrk="0" hangingPunct="1">
+        <a:lnSpc>
+          <a:spcPts val="5800"/>
+        </a:lnSpc>
         <a:spcBef>
           <a:spcPct val="0"/>
         </a:spcBef>
         <a:buNone/>
-        <a:defRPr sz="4400" kern="1200">
+        <a:defRPr sz="5400" kern="1200">
           <a:solidFill>
-            <a:schemeClr val="tx1"/>
+            <a:schemeClr val="tx2"/>
           </a:solidFill>
-          <a:latin typeface="+mj-lt"/>
+          <a:effectLst>
+            <a:outerShdw blurRad="63500" dist="38100" dir="5400000" algn="t" rotWithShape="0">
+              <a:prstClr val="black">
+                <a:alpha val="25000"/>
+              </a:prstClr>
+            </a:outerShdw>
+          </a:effectLst>
+          <a:latin typeface="+mn-lt"/>
           <a:ea typeface="+mj-ea"/>
           <a:cs typeface="+mj-cs"/>
         </a:defRPr>
@@ -2852,11 +3072,14 @@
         </a:spcBef>
         <a:buFont typeface="Arial" pitchFamily="34" charset="0"/>
         <a:buChar char="•"/>
-        <a:defRPr sz="3200" kern="1200">
+        <a:defRPr sz="2400" kern="1200">
           <a:solidFill>
-            <a:schemeClr val="tx1"/>
+            <a:schemeClr val="tx1">
+              <a:lumMod val="50000"/>
+              <a:lumOff val="50000"/>
+            </a:schemeClr>
           </a:solidFill>
-          <a:latin typeface="+mn-lt"/>
+          <a:latin typeface="+mj-lt"/>
           <a:ea typeface="+mn-ea"/>
           <a:cs typeface="+mn-cs"/>
         </a:defRPr>
@@ -2865,13 +3088,16 @@
         <a:spcBef>
           <a:spcPct val="20000"/>
         </a:spcBef>
-        <a:buFont typeface="Arial" pitchFamily="34" charset="0"/>
-        <a:buChar char="–"/>
-        <a:defRPr sz="2800" kern="1200">
+        <a:buFont typeface="Courier New" pitchFamily="49" charset="0"/>
+        <a:buChar char="o"/>
+        <a:defRPr sz="1600" kern="1200">
           <a:solidFill>
-            <a:schemeClr val="tx1"/>
+            <a:schemeClr val="tx1">
+              <a:lumMod val="50000"/>
+              <a:lumOff val="50000"/>
+            </a:schemeClr>
           </a:solidFill>
-          <a:latin typeface="+mn-lt"/>
+          <a:latin typeface="+mj-lt"/>
           <a:ea typeface="+mn-ea"/>
           <a:cs typeface="+mn-cs"/>
         </a:defRPr>
@@ -2882,11 +3108,14 @@
         </a:spcBef>
         <a:buFont typeface="Arial" pitchFamily="34" charset="0"/>
         <a:buChar char="•"/>
-        <a:defRPr sz="2400" kern="1200">
+        <a:defRPr sz="1600" kern="1200">
           <a:solidFill>
-            <a:schemeClr val="tx1"/>
+            <a:schemeClr val="tx1">
+              <a:lumMod val="50000"/>
+              <a:lumOff val="50000"/>
+            </a:schemeClr>
           </a:solidFill>
-          <a:latin typeface="+mn-lt"/>
+          <a:latin typeface="+mj-lt"/>
           <a:ea typeface="+mn-ea"/>
           <a:cs typeface="+mn-cs"/>
         </a:defRPr>
@@ -2895,13 +3124,16 @@
         <a:spcBef>
           <a:spcPct val="20000"/>
         </a:spcBef>
-        <a:buFont typeface="Arial" pitchFamily="34" charset="0"/>
-        <a:buChar char="–"/>
-        <a:defRPr sz="2000" kern="1200">
+        <a:buFont typeface="Courier New" pitchFamily="49" charset="0"/>
+        <a:buChar char="o"/>
+        <a:defRPr sz="1600" kern="1200">
           <a:solidFill>
-            <a:schemeClr val="tx1"/>
+            <a:schemeClr val="tx1">
+              <a:lumMod val="50000"/>
+              <a:lumOff val="50000"/>
+            </a:schemeClr>
           </a:solidFill>
-          <a:latin typeface="+mn-lt"/>
+          <a:latin typeface="+mj-lt"/>
           <a:ea typeface="+mn-ea"/>
           <a:cs typeface="+mn-cs"/>
         </a:defRPr>
@@ -2911,12 +3143,15 @@
           <a:spcPct val="20000"/>
         </a:spcBef>
         <a:buFont typeface="Arial" pitchFamily="34" charset="0"/>
-        <a:buChar char="»"/>
-        <a:defRPr sz="2000" kern="1200">
+        <a:buChar char="•"/>
+        <a:defRPr sz="1600" kern="1200">
           <a:solidFill>
-            <a:schemeClr val="tx1"/>
+            <a:schemeClr val="tx1">
+              <a:lumMod val="50000"/>
+              <a:lumOff val="50000"/>
+            </a:schemeClr>
           </a:solidFill>
-          <a:latin typeface="+mn-lt"/>
+          <a:latin typeface="+mj-lt"/>
           <a:ea typeface="+mn-ea"/>
           <a:cs typeface="+mn-cs"/>
         </a:defRPr>
@@ -2925,13 +3160,16 @@
         <a:spcBef>
           <a:spcPct val="20000"/>
         </a:spcBef>
-        <a:buFont typeface="Arial" pitchFamily="34" charset="0"/>
-        <a:buChar char="•"/>
-        <a:defRPr sz="2000" kern="1200">
+        <a:buFont typeface="Courier New" pitchFamily="49" charset="0"/>
+        <a:buChar char="o"/>
+        <a:defRPr sz="1600" kern="1200">
           <a:solidFill>
-            <a:schemeClr val="tx1"/>
+            <a:schemeClr val="tx1">
+              <a:lumMod val="50000"/>
+              <a:lumOff val="50000"/>
+            </a:schemeClr>
           </a:solidFill>
-          <a:latin typeface="+mn-lt"/>
+          <a:latin typeface="+mj-lt"/>
           <a:ea typeface="+mn-ea"/>
           <a:cs typeface="+mn-cs"/>
         </a:defRPr>
@@ -2942,11 +3180,14 @@
         </a:spcBef>
         <a:buFont typeface="Arial" pitchFamily="34" charset="0"/>
         <a:buChar char="•"/>
-        <a:defRPr sz="2000" kern="1200">
+        <a:defRPr sz="1600" kern="1200">
           <a:solidFill>
-            <a:schemeClr val="tx1"/>
+            <a:schemeClr val="tx1">
+              <a:lumMod val="50000"/>
+              <a:lumOff val="50000"/>
+            </a:schemeClr>
           </a:solidFill>
-          <a:latin typeface="+mn-lt"/>
+          <a:latin typeface="+mj-lt"/>
           <a:ea typeface="+mn-ea"/>
           <a:cs typeface="+mn-cs"/>
         </a:defRPr>
@@ -2955,13 +3196,16 @@
         <a:spcBef>
           <a:spcPct val="20000"/>
         </a:spcBef>
-        <a:buFont typeface="Arial" pitchFamily="34" charset="0"/>
-        <a:buChar char="•"/>
-        <a:defRPr sz="2000" kern="1200">
+        <a:buFont typeface="Courier New" pitchFamily="49" charset="0"/>
+        <a:buChar char="o"/>
+        <a:defRPr sz="1600" kern="1200">
           <a:solidFill>
-            <a:schemeClr val="tx1"/>
+            <a:schemeClr val="tx1">
+              <a:lumMod val="50000"/>
+              <a:lumOff val="50000"/>
+            </a:schemeClr>
           </a:solidFill>
-          <a:latin typeface="+mn-lt"/>
+          <a:latin typeface="+mj-lt"/>
           <a:ea typeface="+mn-ea"/>
           <a:cs typeface="+mn-cs"/>
         </a:defRPr>
@@ -2972,11 +3216,14 @@
         </a:spcBef>
         <a:buFont typeface="Arial" pitchFamily="34" charset="0"/>
         <a:buChar char="•"/>
-        <a:defRPr sz="2000" kern="1200">
+        <a:defRPr sz="1600" kern="1200">
           <a:solidFill>
-            <a:schemeClr val="tx1"/>
+            <a:schemeClr val="tx1">
+              <a:lumMod val="50000"/>
+              <a:lumOff val="50000"/>
+            </a:schemeClr>
           </a:solidFill>
-          <a:latin typeface="+mn-lt"/>
+          <a:latin typeface="+mj-lt"/>
           <a:ea typeface="+mn-ea"/>
           <a:cs typeface="+mn-cs"/>
         </a:defRPr>
@@ -3110,7 +3357,9 @@
         </p:nvSpPr>
         <p:spPr/>
         <p:txBody>
-          <a:bodyPr/>
+          <a:bodyPr>
+            <a:normAutofit/>
+          </a:bodyPr>
           <a:lstStyle/>
           <a:p>
             <a:r>
@@ -3137,7 +3386,9 @@
         </p:nvSpPr>
         <p:spPr/>
         <p:txBody>
-          <a:bodyPr/>
+          <a:bodyPr>
+            <a:normAutofit/>
+          </a:bodyPr>
           <a:lstStyle/>
           <a:p>
             <a:r>
@@ -3222,7 +3473,7 @@
             <a:spLocks noGrp="1"/>
           </p:cNvSpPr>
           <p:nvPr>
-            <p:ph sz="half" idx="1"/>
+            <p:ph sz="half" idx="2"/>
           </p:nvPr>
         </p:nvSpPr>
         <p:spPr/>
@@ -3266,7 +3517,7 @@
             <a:picLocks noGrp="1" noChangeAspect="1"/>
           </p:cNvPicPr>
           <p:nvPr>
-            <p:ph sz="half" idx="2"/>
+            <p:ph sz="quarter" idx="13"/>
           </p:nvPr>
         </p:nvPicPr>
         <p:blipFill>
@@ -3283,8 +3534,8 @@
         </p:blipFill>
         <p:spPr>
           <a:xfrm>
-            <a:off x="4914900" y="2339181"/>
-            <a:ext cx="3505200" cy="3048000"/>
+            <a:off x="365125" y="2105888"/>
+            <a:ext cx="4041775" cy="3514586"/>
           </a:xfrm>
         </p:spPr>
       </p:pic>
@@ -3516,9 +3767,9 @@
 </file>
 
 <file path=ppt/theme/theme1.xml><?xml version="1.0" encoding="utf-8"?>
-<a:theme xmlns:a="http://schemas.openxmlformats.org/drawingml/2006/main" name="Office Theme">
+<a:theme xmlns:a="http://schemas.openxmlformats.org/drawingml/2006/main" name="Executive">
   <a:themeElements>
-    <a:clrScheme name="Office">
+    <a:clrScheme name="Executive">
       <a:dk1>
         <a:sysClr val="windowText" lastClr="000000"/>
       </a:dk1>
@@ -3526,48 +3777,83 @@
         <a:sysClr val="window" lastClr="FFFFFF"/>
       </a:lt1>
       <a:dk2>
-        <a:srgbClr val="1F497D"/>
+        <a:srgbClr val="2F5897"/>
       </a:dk2>
       <a:lt2>
-        <a:srgbClr val="EEECE1"/>
+        <a:srgbClr val="E4E9EF"/>
       </a:lt2>
       <a:accent1>
-        <a:srgbClr val="4F81BD"/>
+        <a:srgbClr val="6076B4"/>
       </a:accent1>
       <a:accent2>
-        <a:srgbClr val="C0504D"/>
+        <a:srgbClr val="9C5252"/>
       </a:accent2>
       <a:accent3>
-        <a:srgbClr val="9BBB59"/>
+        <a:srgbClr val="E68422"/>
       </a:accent3>
       <a:accent4>
-        <a:srgbClr val="8064A2"/>
+        <a:srgbClr val="846648"/>
       </a:accent4>
       <a:accent5>
-        <a:srgbClr val="4BACC6"/>
+        <a:srgbClr val="63891F"/>
       </a:accent5>
       <a:accent6>
-        <a:srgbClr val="F79646"/>
+        <a:srgbClr val="758085"/>
       </a:accent6>
       <a:hlink>
-        <a:srgbClr val="0000FF"/>
+        <a:srgbClr val="3399FF"/>
       </a:hlink>
       <a:folHlink>
-        <a:srgbClr val="800080"/>
+        <a:srgbClr val="B2B2B2"/>
       </a:folHlink>
     </a:clrScheme>
-    <a:fontScheme name="Office">
+    <a:fontScheme name="Executive">
       <a:majorFont>
-        <a:latin typeface="Calibri"/>
+        <a:latin typeface="Century Gothic"/>
         <a:ea typeface=""/>
         <a:cs typeface=""/>
-        <a:font script="Jpan" typeface="ＭＳ Ｐゴシック"/>
+        <a:font script="Jpan" typeface="HGｺﾞｼｯｸM"/>
+        <a:font script="Hang" typeface="HY중고딕"/>
+        <a:font script="Hans" typeface="幼圆"/>
+        <a:font script="Hant" typeface="微軟正黑體"/>
+        <a:font script="Arab" typeface="Tahoma"/>
+        <a:font script="Hebr" typeface="Gisha"/>
+        <a:font script="Thai" typeface="DilleniaUPC"/>
+        <a:font script="Ethi" typeface="Nyala"/>
+        <a:font script="Beng" typeface="Vrinda"/>
+        <a:font script="Gujr" typeface="Shruti"/>
+        <a:font script="Khmr" typeface="DaunPenh"/>
+        <a:font script="Knda" typeface="Tunga"/>
+        <a:font script="Guru" typeface="Raavi"/>
+        <a:font script="Cans" typeface="Euphemia"/>
+        <a:font script="Cher" typeface="Plantagenet Cherokee"/>
+        <a:font script="Yiii" typeface="Microsoft Yi Baiti"/>
+        <a:font script="Tibt" typeface="Microsoft Himalaya"/>
+        <a:font script="Thaa" typeface="MV Boli"/>
+        <a:font script="Deva" typeface="Mangal"/>
+        <a:font script="Telu" typeface="Gautami"/>
+        <a:font script="Taml" typeface="Latha"/>
+        <a:font script="Syrc" typeface="Estrangelo Edessa"/>
+        <a:font script="Orya" typeface="Kalinga"/>
+        <a:font script="Mlym" typeface="Kartika"/>
+        <a:font script="Laoo" typeface="DokChampa"/>
+        <a:font script="Sinh" typeface="Iskoola Pota"/>
+        <a:font script="Mong" typeface="Mongolian Baiti"/>
+        <a:font script="Viet" typeface="Tahoma"/>
+        <a:font script="Uigh" typeface="Microsoft Uighur"/>
+        <a:font script="Geor" typeface="Sylfaen"/>
+      </a:majorFont>
+      <a:minorFont>
+        <a:latin typeface="Palatino Linotype"/>
+        <a:ea typeface=""/>
+        <a:cs typeface=""/>
+        <a:font script="Jpan" typeface="HGS明朝E"/>
         <a:font script="Hang" typeface="맑은 고딕"/>
         <a:font script="Hans" typeface="宋体"/>
         <a:font script="Hant" typeface="新細明體"/>
         <a:font script="Arab" typeface="Times New Roman"/>
         <a:font script="Hebr" typeface="Times New Roman"/>
-        <a:font script="Thai" typeface="Angsana New"/>
+        <a:font script="Thai" typeface="Browallia New"/>
         <a:font script="Ethi" typeface="Nyala"/>
         <a:font script="Beng" typeface="Vrinda"/>
         <a:font script="Gujr" typeface="Shruti"/>
@@ -3591,44 +3877,9 @@
         <a:font script="Viet" typeface="Times New Roman"/>
         <a:font script="Uigh" typeface="Microsoft Uighur"/>
         <a:font script="Geor" typeface="Sylfaen"/>
-      </a:majorFont>
-      <a:minorFont>
-        <a:latin typeface="Calibri"/>
-        <a:ea typeface=""/>
-        <a:cs typeface=""/>
-        <a:font script="Jpan" typeface="ＭＳ Ｐゴシック"/>
-        <a:font script="Hang" typeface="맑은 고딕"/>
-        <a:font script="Hans" typeface="宋体"/>
-        <a:font script="Hant" typeface="新細明體"/>
-        <a:font script="Arab" typeface="Arial"/>
-        <a:font script="Hebr" typeface="Arial"/>
-        <a:font script="Thai" typeface="Cordia New"/>
-        <a:font script="Ethi" typeface="Nyala"/>
-        <a:font script="Beng" typeface="Vrinda"/>
-        <a:font script="Gujr" typeface="Shruti"/>
-        <a:font script="Khmr" typeface="DaunPenh"/>
-        <a:font script="Knda" typeface="Tunga"/>
-        <a:font script="Guru" typeface="Raavi"/>
-        <a:font script="Cans" typeface="Euphemia"/>
-        <a:font script="Cher" typeface="Plantagenet Cherokee"/>
-        <a:font script="Yiii" typeface="Microsoft Yi Baiti"/>
-        <a:font script="Tibt" typeface="Microsoft Himalaya"/>
-        <a:font script="Thaa" typeface="MV Boli"/>
-        <a:font script="Deva" typeface="Mangal"/>
-        <a:font script="Telu" typeface="Gautami"/>
-        <a:font script="Taml" typeface="Latha"/>
-        <a:font script="Syrc" typeface="Estrangelo Edessa"/>
-        <a:font script="Orya" typeface="Kalinga"/>
-        <a:font script="Mlym" typeface="Kartika"/>
-        <a:font script="Laoo" typeface="DokChampa"/>
-        <a:font script="Sinh" typeface="Iskoola Pota"/>
-        <a:font script="Mong" typeface="Mongolian Baiti"/>
-        <a:font script="Viet" typeface="Arial"/>
-        <a:font script="Uigh" typeface="Microsoft Uighur"/>
-        <a:font script="Geor" typeface="Sylfaen"/>
       </a:minorFont>
     </a:fontScheme>
-    <a:fmtScheme name="Office">
+    <a:fmtScheme name="Executive">
       <a:fillStyleLst>
         <a:solidFill>
           <a:schemeClr val="phClr"/>
@@ -3690,13 +3941,13 @@
           </a:solidFill>
           <a:prstDash val="solid"/>
         </a:ln>
-        <a:ln w="25400" cap="flat" cmpd="sng" algn="ctr">
+        <a:ln w="28575" cap="flat" cmpd="sng" algn="ctr">
           <a:solidFill>
             <a:schemeClr val="phClr"/>
           </a:solidFill>
           <a:prstDash val="solid"/>
         </a:ln>
-        <a:ln w="38100" cap="flat" cmpd="sng" algn="ctr">
+        <a:ln w="50800" cap="flat" cmpd="sng" algn="ctr">
           <a:solidFill>
             <a:schemeClr val="phClr"/>
           </a:solidFill>
@@ -3749,42 +4000,24 @@
         </a:solidFill>
         <a:gradFill rotWithShape="1">
           <a:gsLst>
-            <a:gs pos="0">
+            <a:gs pos="50000">
               <a:schemeClr val="phClr">
-                <a:tint val="40000"/>
-                <a:satMod val="350000"/>
+                <a:tint val="80000"/>
+                <a:satMod val="250000"/>
               </a:schemeClr>
             </a:gs>
-            <a:gs pos="40000">
+            <a:gs pos="76000">
               <a:schemeClr val="phClr">
-                <a:tint val="45000"/>
-                <a:shade val="99000"/>
-                <a:satMod val="350000"/>
+                <a:tint val="90000"/>
+                <a:shade val="90000"/>
+                <a:satMod val="200000"/>
               </a:schemeClr>
             </a:gs>
-            <a:gs pos="100000">
+            <a:gs pos="92000">
               <a:schemeClr val="phClr">
-                <a:shade val="20000"/>
-                <a:satMod val="255000"/>
-              </a:schemeClr>
-            </a:gs>
-          </a:gsLst>
-          <a:path path="circle">
-            <a:fillToRect l="50000" t="-80000" r="50000" b="180000"/>
-          </a:path>
-        </a:gradFill>
-        <a:gradFill rotWithShape="1">
-          <a:gsLst>
-            <a:gs pos="0">
-              <a:schemeClr val="phClr">
-                <a:tint val="80000"/>
-                <a:satMod val="300000"/>
-              </a:schemeClr>
-            </a:gs>
-            <a:gs pos="100000">
-              <a:schemeClr val="phClr">
-                <a:shade val="30000"/>
-                <a:satMod val="200000"/>
+                <a:tint val="90000"/>
+                <a:shade val="70000"/>
+                <a:satMod val="250000"/>
               </a:schemeClr>
             </a:gs>
           </a:gsLst>
@@ -3792,6 +4025,19 @@
             <a:fillToRect l="50000" t="50000" r="50000" b="50000"/>
           </a:path>
         </a:gradFill>
+        <a:blipFill>
+          <a:blip xmlns:r="http://schemas.openxmlformats.org/officeDocument/2006/relationships" r:embed="rId1">
+            <a:duotone>
+              <a:schemeClr val="phClr">
+                <a:tint val="95000"/>
+              </a:schemeClr>
+              <a:schemeClr val="phClr">
+                <a:shade val="90000"/>
+              </a:schemeClr>
+            </a:duotone>
+          </a:blip>
+          <a:tile tx="0" ty="0" sx="100000" sy="100000" flip="none" algn="tl"/>
+        </a:blipFill>
       </a:bgFillStyleLst>
     </a:fmtScheme>
   </a:themeElements>

</xml_diff>

<commit_message>
GetOnTheBus slides are kinda ready. The basic structure is there - might want to find some nice pictures or something.
</commit_message>
<xml_diff>
--- a/GetOnTheBus/Get on the Bus with MassTransit.pptx
+++ b/GetOnTheBus/Get on the Bus with MassTransit.pptx
@@ -7,8 +7,22 @@
   <p:sldIdLst>
     <p:sldId id="256" r:id="rId2"/>
     <p:sldId id="257" r:id="rId3"/>
-    <p:sldId id="258" r:id="rId4"/>
-    <p:sldId id="259" r:id="rId5"/>
+    <p:sldId id="270" r:id="rId4"/>
+    <p:sldId id="271" r:id="rId5"/>
+    <p:sldId id="272" r:id="rId6"/>
+    <p:sldId id="269" r:id="rId7"/>
+    <p:sldId id="273" r:id="rId8"/>
+    <p:sldId id="266" r:id="rId9"/>
+    <p:sldId id="267" r:id="rId10"/>
+    <p:sldId id="268" r:id="rId11"/>
+    <p:sldId id="263" r:id="rId12"/>
+    <p:sldId id="264" r:id="rId13"/>
+    <p:sldId id="265" r:id="rId14"/>
+    <p:sldId id="260" r:id="rId15"/>
+    <p:sldId id="261" r:id="rId16"/>
+    <p:sldId id="262" r:id="rId17"/>
+    <p:sldId id="258" r:id="rId18"/>
+    <p:sldId id="259" r:id="rId19"/>
   </p:sldIdLst>
   <p:sldSz cx="9144000" cy="6858000" type="screen4x3"/>
   <p:notesSz cx="6858000" cy="9144000"/>
@@ -302,7 +316,7 @@
           <a:p>
             <a:fld id="{5A87423E-21AC-4CFB-A97C-80CE3F3C4BEE}" type="datetimeFigureOut">
               <a:rPr lang="en-US" smtClean="0"/>
-              <a:t>5/4/2012</a:t>
+              <a:t>5/7/2012</a:t>
             </a:fld>
             <a:endParaRPr lang="en-US"/>
           </a:p>
@@ -467,7 +481,7 @@
           <a:p>
             <a:fld id="{5A87423E-21AC-4CFB-A97C-80CE3F3C4BEE}" type="datetimeFigureOut">
               <a:rPr lang="en-US" smtClean="0"/>
-              <a:t>5/4/2012</a:t>
+              <a:t>5/7/2012</a:t>
             </a:fld>
             <a:endParaRPr lang="en-US"/>
           </a:p>
@@ -642,7 +656,7 @@
           <a:p>
             <a:fld id="{5A87423E-21AC-4CFB-A97C-80CE3F3C4BEE}" type="datetimeFigureOut">
               <a:rPr lang="en-US" smtClean="0"/>
-              <a:t>5/4/2012</a:t>
+              <a:t>5/7/2012</a:t>
             </a:fld>
             <a:endParaRPr lang="en-US"/>
           </a:p>
@@ -825,7 +839,7 @@
           <a:p>
             <a:fld id="{5A87423E-21AC-4CFB-A97C-80CE3F3C4BEE}" type="datetimeFigureOut">
               <a:rPr lang="en-US" smtClean="0"/>
-              <a:t>5/4/2012</a:t>
+              <a:t>5/7/2012</a:t>
             </a:fld>
             <a:endParaRPr lang="en-US"/>
           </a:p>
@@ -1087,7 +1101,7 @@
           <a:p>
             <a:fld id="{5A87423E-21AC-4CFB-A97C-80CE3F3C4BEE}" type="datetimeFigureOut">
               <a:rPr lang="en-US" smtClean="0"/>
-              <a:t>5/4/2012</a:t>
+              <a:t>5/7/2012</a:t>
             </a:fld>
             <a:endParaRPr lang="en-US"/>
           </a:p>
@@ -1435,7 +1449,7 @@
           <a:p>
             <a:fld id="{5A87423E-21AC-4CFB-A97C-80CE3F3C4BEE}" type="datetimeFigureOut">
               <a:rPr lang="en-US" smtClean="0"/>
-              <a:t>5/4/2012</a:t>
+              <a:t>5/7/2012</a:t>
             </a:fld>
             <a:endParaRPr lang="en-US"/>
           </a:p>
@@ -1743,7 +1757,7 @@
           <a:p>
             <a:fld id="{5A87423E-21AC-4CFB-A97C-80CE3F3C4BEE}" type="datetimeFigureOut">
               <a:rPr lang="en-US" smtClean="0"/>
-              <a:t>5/4/2012</a:t>
+              <a:t>5/7/2012</a:t>
             </a:fld>
             <a:endParaRPr lang="en-US"/>
           </a:p>
@@ -1970,7 +1984,7 @@
           <a:p>
             <a:fld id="{5A87423E-21AC-4CFB-A97C-80CE3F3C4BEE}" type="datetimeFigureOut">
               <a:rPr lang="en-US" smtClean="0"/>
-              <a:t>5/4/2012</a:t>
+              <a:t>5/7/2012</a:t>
             </a:fld>
             <a:endParaRPr lang="en-US"/>
           </a:p>
@@ -2060,7 +2074,7 @@
           <a:p>
             <a:fld id="{5A87423E-21AC-4CFB-A97C-80CE3F3C4BEE}" type="datetimeFigureOut">
               <a:rPr lang="en-US" smtClean="0"/>
-              <a:t>5/4/2012</a:t>
+              <a:t>5/7/2012</a:t>
             </a:fld>
             <a:endParaRPr lang="en-US"/>
           </a:p>
@@ -2348,7 +2362,7 @@
           <a:p>
             <a:fld id="{5A87423E-21AC-4CFB-A97C-80CE3F3C4BEE}" type="datetimeFigureOut">
               <a:rPr lang="en-US" smtClean="0"/>
-              <a:t>5/4/2012</a:t>
+              <a:t>5/7/2012</a:t>
             </a:fld>
             <a:endParaRPr lang="en-US"/>
           </a:p>
@@ -2617,7 +2631,7 @@
           <a:p>
             <a:fld id="{5A87423E-21AC-4CFB-A97C-80CE3F3C4BEE}" type="datetimeFigureOut">
               <a:rPr lang="en-US" smtClean="0"/>
-              <a:t>5/4/2012</a:t>
+              <a:t>5/7/2012</a:t>
             </a:fld>
             <a:endParaRPr lang="en-US"/>
           </a:p>
@@ -2827,7 +2841,7 @@
           <a:p>
             <a:fld id="{5A87423E-21AC-4CFB-A97C-80CE3F3C4BEE}" type="datetimeFigureOut">
               <a:rPr lang="en-US" smtClean="0"/>
-              <a:t>5/4/2012</a:t>
+              <a:t>5/7/2012</a:t>
             </a:fld>
             <a:endParaRPr lang="en-US"/>
           </a:p>
@@ -3387,21 +3401,21 @@
         <p:spPr/>
         <p:txBody>
           <a:bodyPr>
-            <a:normAutofit/>
+            <a:noAutofit/>
           </a:bodyPr>
           <a:lstStyle/>
           <a:p>
             <a:r>
-              <a:rPr lang="en-US" dirty="0" smtClean="0"/>
+              <a:rPr lang="en-US" sz="3600" dirty="0" smtClean="0"/>
               <a:t>Eric Kepes</a:t>
             </a:r>
           </a:p>
           <a:p>
             <a:r>
-              <a:rPr lang="en-US" dirty="0" smtClean="0"/>
+              <a:rPr lang="en-US" sz="3600" dirty="0" smtClean="0"/>
               <a:t>Philly Code Camp 2012.2</a:t>
             </a:r>
-            <a:endParaRPr lang="en-US" dirty="0"/>
+            <a:endParaRPr lang="en-US" sz="3600" dirty="0"/>
           </a:p>
         </p:txBody>
       </p:sp>
@@ -3409,6 +3423,1003 @@
     <p:extLst>
       <p:ext uri="{BB962C8B-B14F-4D97-AF65-F5344CB8AC3E}">
         <p14:creationId xmlns:p14="http://schemas.microsoft.com/office/powerpoint/2010/main" val="3117612169"/>
+      </p:ext>
+    </p:extLst>
+  </p:cSld>
+  <p:clrMapOvr>
+    <a:masterClrMapping/>
+  </p:clrMapOvr>
+</p:sld>
+</file>
+
+<file path=ppt/slides/slide10.xml><?xml version="1.0" encoding="utf-8"?>
+<p:sld xmlns:a="http://schemas.openxmlformats.org/drawingml/2006/main" xmlns:r="http://schemas.openxmlformats.org/officeDocument/2006/relationships" xmlns:p="http://schemas.openxmlformats.org/presentationml/2006/main">
+  <p:cSld>
+    <p:spTree>
+      <p:nvGrpSpPr>
+        <p:cNvPr id="1" name=""/>
+        <p:cNvGrpSpPr/>
+        <p:nvPr/>
+      </p:nvGrpSpPr>
+      <p:grpSpPr>
+        <a:xfrm>
+          <a:off x="0" y="0"/>
+          <a:ext cx="0" cy="0"/>
+          <a:chOff x="0" y="0"/>
+          <a:chExt cx="0" cy="0"/>
+        </a:xfrm>
+      </p:grpSpPr>
+      <p:sp>
+        <p:nvSpPr>
+          <p:cNvPr id="7" name="Title 6"/>
+          <p:cNvSpPr>
+            <a:spLocks noGrp="1"/>
+          </p:cNvSpPr>
+          <p:nvPr>
+            <p:ph type="title"/>
+          </p:nvPr>
+        </p:nvSpPr>
+        <p:spPr/>
+        <p:txBody>
+          <a:bodyPr/>
+          <a:lstStyle/>
+          <a:p>
+            <a:r>
+              <a:rPr lang="en-US" dirty="0" smtClean="0"/>
+              <a:t>Error Handling Demo</a:t>
+            </a:r>
+            <a:endParaRPr lang="en-US" dirty="0"/>
+          </a:p>
+        </p:txBody>
+      </p:sp>
+      <p:sp>
+        <p:nvSpPr>
+          <p:cNvPr id="8" name="Text Placeholder 7"/>
+          <p:cNvSpPr>
+            <a:spLocks noGrp="1"/>
+          </p:cNvSpPr>
+          <p:nvPr>
+            <p:ph type="body" idx="1"/>
+          </p:nvPr>
+        </p:nvSpPr>
+        <p:spPr/>
+        <p:txBody>
+          <a:bodyPr/>
+          <a:lstStyle/>
+          <a:p>
+            <a:endParaRPr lang="en-US"/>
+          </a:p>
+        </p:txBody>
+      </p:sp>
+    </p:spTree>
+    <p:extLst>
+      <p:ext uri="{BB962C8B-B14F-4D97-AF65-F5344CB8AC3E}">
+        <p14:creationId xmlns:p14="http://schemas.microsoft.com/office/powerpoint/2010/main" val="3302223023"/>
+      </p:ext>
+    </p:extLst>
+  </p:cSld>
+  <p:clrMapOvr>
+    <a:masterClrMapping/>
+  </p:clrMapOvr>
+</p:sld>
+</file>
+
+<file path=ppt/slides/slide11.xml><?xml version="1.0" encoding="utf-8"?>
+<p:sld xmlns:a="http://schemas.openxmlformats.org/drawingml/2006/main" xmlns:r="http://schemas.openxmlformats.org/officeDocument/2006/relationships" xmlns:p="http://schemas.openxmlformats.org/presentationml/2006/main">
+  <p:cSld>
+    <p:spTree>
+      <p:nvGrpSpPr>
+        <p:cNvPr id="1" name=""/>
+        <p:cNvGrpSpPr/>
+        <p:nvPr/>
+      </p:nvGrpSpPr>
+      <p:grpSpPr>
+        <a:xfrm>
+          <a:off x="0" y="0"/>
+          <a:ext cx="0" cy="0"/>
+          <a:chOff x="0" y="0"/>
+          <a:chExt cx="0" cy="0"/>
+        </a:xfrm>
+      </p:grpSpPr>
+      <p:sp>
+        <p:nvSpPr>
+          <p:cNvPr id="5" name="Title 4"/>
+          <p:cNvSpPr>
+            <a:spLocks noGrp="1"/>
+          </p:cNvSpPr>
+          <p:nvPr>
+            <p:ph type="title"/>
+          </p:nvPr>
+        </p:nvSpPr>
+        <p:spPr/>
+        <p:txBody>
+          <a:bodyPr/>
+          <a:lstStyle/>
+          <a:p>
+            <a:r>
+              <a:rPr lang="en-US" dirty="0" smtClean="0"/>
+              <a:t>Sagas</a:t>
+            </a:r>
+            <a:endParaRPr lang="en-US" dirty="0"/>
+          </a:p>
+        </p:txBody>
+      </p:sp>
+      <p:sp>
+        <p:nvSpPr>
+          <p:cNvPr id="6" name="Content Placeholder 5"/>
+          <p:cNvSpPr>
+            <a:spLocks noGrp="1"/>
+          </p:cNvSpPr>
+          <p:nvPr>
+            <p:ph idx="1"/>
+          </p:nvPr>
+        </p:nvSpPr>
+        <p:spPr/>
+        <p:txBody>
+          <a:bodyPr>
+            <a:normAutofit/>
+          </a:bodyPr>
+          <a:lstStyle/>
+          <a:p>
+            <a:r>
+              <a:rPr lang="en-US" sz="3600" dirty="0" smtClean="0"/>
+              <a:t>Long Running Transactions</a:t>
+            </a:r>
+          </a:p>
+          <a:p>
+            <a:r>
+              <a:rPr lang="en-US" sz="3600" dirty="0" smtClean="0"/>
+              <a:t>State Machines</a:t>
+            </a:r>
+            <a:endParaRPr lang="en-US" sz="3600" dirty="0"/>
+          </a:p>
+        </p:txBody>
+      </p:sp>
+    </p:spTree>
+    <p:extLst>
+      <p:ext uri="{BB962C8B-B14F-4D97-AF65-F5344CB8AC3E}">
+        <p14:creationId xmlns:p14="http://schemas.microsoft.com/office/powerpoint/2010/main" val="2119905561"/>
+      </p:ext>
+    </p:extLst>
+  </p:cSld>
+  <p:clrMapOvr>
+    <a:masterClrMapping/>
+  </p:clrMapOvr>
+</p:sld>
+</file>
+
+<file path=ppt/slides/slide12.xml><?xml version="1.0" encoding="utf-8"?>
+<p:sld xmlns:a="http://schemas.openxmlformats.org/drawingml/2006/main" xmlns:r="http://schemas.openxmlformats.org/officeDocument/2006/relationships" xmlns:p="http://schemas.openxmlformats.org/presentationml/2006/main">
+  <p:cSld>
+    <p:spTree>
+      <p:nvGrpSpPr>
+        <p:cNvPr id="1" name=""/>
+        <p:cNvGrpSpPr/>
+        <p:nvPr/>
+      </p:nvGrpSpPr>
+      <p:grpSpPr>
+        <a:xfrm>
+          <a:off x="0" y="0"/>
+          <a:ext cx="0" cy="0"/>
+          <a:chOff x="0" y="0"/>
+          <a:chExt cx="0" cy="0"/>
+        </a:xfrm>
+      </p:grpSpPr>
+      <p:sp>
+        <p:nvSpPr>
+          <p:cNvPr id="2" name="Title 1"/>
+          <p:cNvSpPr>
+            <a:spLocks noGrp="1"/>
+          </p:cNvSpPr>
+          <p:nvPr>
+            <p:ph type="title"/>
+          </p:nvPr>
+        </p:nvSpPr>
+        <p:spPr/>
+        <p:txBody>
+          <a:bodyPr/>
+          <a:lstStyle/>
+          <a:p>
+            <a:r>
+              <a:rPr lang="en-US" dirty="0" smtClean="0"/>
+              <a:t>Additional Queues</a:t>
+            </a:r>
+            <a:endParaRPr lang="en-US" dirty="0"/>
+          </a:p>
+        </p:txBody>
+      </p:sp>
+      <p:sp>
+        <p:nvSpPr>
+          <p:cNvPr id="3" name="Content Placeholder 2"/>
+          <p:cNvSpPr>
+            <a:spLocks noGrp="1"/>
+          </p:cNvSpPr>
+          <p:nvPr>
+            <p:ph idx="1"/>
+          </p:nvPr>
+        </p:nvSpPr>
+        <p:spPr/>
+        <p:txBody>
+          <a:bodyPr>
+            <a:normAutofit/>
+          </a:bodyPr>
+          <a:lstStyle/>
+          <a:p>
+            <a:r>
+              <a:rPr lang="en-US" sz="3600" dirty="0" err="1" smtClean="0"/>
+              <a:t>ActiveMQ</a:t>
+            </a:r>
+            <a:endParaRPr lang="en-US" sz="3600" dirty="0" smtClean="0"/>
+          </a:p>
+          <a:p>
+            <a:r>
+              <a:rPr lang="en-US" sz="3600" dirty="0" err="1" smtClean="0"/>
+              <a:t>ZeroMQ</a:t>
+            </a:r>
+            <a:endParaRPr lang="en-US" sz="3600" dirty="0" smtClean="0"/>
+          </a:p>
+          <a:p>
+            <a:r>
+              <a:rPr lang="en-US" sz="3600" dirty="0" smtClean="0"/>
+              <a:t>Azure Queues</a:t>
+            </a:r>
+            <a:endParaRPr lang="en-US" sz="3600" dirty="0"/>
+          </a:p>
+        </p:txBody>
+      </p:sp>
+    </p:spTree>
+    <p:extLst>
+      <p:ext uri="{BB962C8B-B14F-4D97-AF65-F5344CB8AC3E}">
+        <p14:creationId xmlns:p14="http://schemas.microsoft.com/office/powerpoint/2010/main" val="193731891"/>
+      </p:ext>
+    </p:extLst>
+  </p:cSld>
+  <p:clrMapOvr>
+    <a:masterClrMapping/>
+  </p:clrMapOvr>
+</p:sld>
+</file>
+
+<file path=ppt/slides/slide13.xml><?xml version="1.0" encoding="utf-8"?>
+<p:sld xmlns:a="http://schemas.openxmlformats.org/drawingml/2006/main" xmlns:r="http://schemas.openxmlformats.org/officeDocument/2006/relationships" xmlns:p="http://schemas.openxmlformats.org/presentationml/2006/main">
+  <p:cSld>
+    <p:spTree>
+      <p:nvGrpSpPr>
+        <p:cNvPr id="1" name=""/>
+        <p:cNvGrpSpPr/>
+        <p:nvPr/>
+      </p:nvGrpSpPr>
+      <p:grpSpPr>
+        <a:xfrm>
+          <a:off x="0" y="0"/>
+          <a:ext cx="0" cy="0"/>
+          <a:chOff x="0" y="0"/>
+          <a:chExt cx="0" cy="0"/>
+        </a:xfrm>
+      </p:grpSpPr>
+      <p:sp>
+        <p:nvSpPr>
+          <p:cNvPr id="2" name="Title 1"/>
+          <p:cNvSpPr>
+            <a:spLocks noGrp="1"/>
+          </p:cNvSpPr>
+          <p:nvPr>
+            <p:ph type="title"/>
+          </p:nvPr>
+        </p:nvSpPr>
+        <p:spPr/>
+        <p:txBody>
+          <a:bodyPr/>
+          <a:lstStyle/>
+          <a:p>
+            <a:r>
+              <a:rPr lang="en-US" dirty="0" smtClean="0"/>
+              <a:t>Additional Clients</a:t>
+            </a:r>
+            <a:endParaRPr lang="en-US" dirty="0"/>
+          </a:p>
+        </p:txBody>
+      </p:sp>
+      <p:sp>
+        <p:nvSpPr>
+          <p:cNvPr id="3" name="Content Placeholder 2"/>
+          <p:cNvSpPr>
+            <a:spLocks noGrp="1"/>
+          </p:cNvSpPr>
+          <p:nvPr>
+            <p:ph idx="1"/>
+          </p:nvPr>
+        </p:nvSpPr>
+        <p:spPr/>
+        <p:txBody>
+          <a:bodyPr>
+            <a:normAutofit/>
+          </a:bodyPr>
+          <a:lstStyle/>
+          <a:p>
+            <a:r>
+              <a:rPr lang="en-US" sz="3600" dirty="0" smtClean="0"/>
+              <a:t>JavaScript</a:t>
+            </a:r>
+          </a:p>
+          <a:p>
+            <a:r>
+              <a:rPr lang="en-US" sz="3600" dirty="0" smtClean="0"/>
+              <a:t>Ruby</a:t>
+            </a:r>
+          </a:p>
+          <a:p>
+            <a:r>
+              <a:rPr lang="en-US" sz="3600" dirty="0" smtClean="0"/>
+              <a:t>Write Your Own</a:t>
+            </a:r>
+            <a:endParaRPr lang="en-US" sz="3600" dirty="0"/>
+          </a:p>
+        </p:txBody>
+      </p:sp>
+    </p:spTree>
+    <p:extLst>
+      <p:ext uri="{BB962C8B-B14F-4D97-AF65-F5344CB8AC3E}">
+        <p14:creationId xmlns:p14="http://schemas.microsoft.com/office/powerpoint/2010/main" val="1240225175"/>
+      </p:ext>
+    </p:extLst>
+  </p:cSld>
+  <p:clrMapOvr>
+    <a:masterClrMapping/>
+  </p:clrMapOvr>
+</p:sld>
+</file>
+
+<file path=ppt/slides/slide14.xml><?xml version="1.0" encoding="utf-8"?>
+<p:sld xmlns:a="http://schemas.openxmlformats.org/drawingml/2006/main" xmlns:r="http://schemas.openxmlformats.org/officeDocument/2006/relationships" xmlns:p="http://schemas.openxmlformats.org/presentationml/2006/main">
+  <p:cSld>
+    <p:spTree>
+      <p:nvGrpSpPr>
+        <p:cNvPr id="1" name=""/>
+        <p:cNvGrpSpPr/>
+        <p:nvPr/>
+      </p:nvGrpSpPr>
+      <p:grpSpPr>
+        <a:xfrm>
+          <a:off x="0" y="0"/>
+          <a:ext cx="0" cy="0"/>
+          <a:chOff x="0" y="0"/>
+          <a:chExt cx="0" cy="0"/>
+        </a:xfrm>
+      </p:grpSpPr>
+      <p:sp>
+        <p:nvSpPr>
+          <p:cNvPr id="2" name="Title 1"/>
+          <p:cNvSpPr>
+            <a:spLocks noGrp="1"/>
+          </p:cNvSpPr>
+          <p:nvPr>
+            <p:ph type="title"/>
+          </p:nvPr>
+        </p:nvSpPr>
+        <p:spPr/>
+        <p:txBody>
+          <a:bodyPr/>
+          <a:lstStyle/>
+          <a:p>
+            <a:r>
+              <a:rPr lang="en-US" dirty="0" smtClean="0"/>
+              <a:t>Further Reading</a:t>
+            </a:r>
+            <a:endParaRPr lang="en-US" dirty="0"/>
+          </a:p>
+        </p:txBody>
+      </p:sp>
+      <p:sp>
+        <p:nvSpPr>
+          <p:cNvPr id="3" name="Content Placeholder 2"/>
+          <p:cNvSpPr>
+            <a:spLocks noGrp="1"/>
+          </p:cNvSpPr>
+          <p:nvPr>
+            <p:ph sz="half" idx="2"/>
+          </p:nvPr>
+        </p:nvSpPr>
+        <p:spPr/>
+        <p:txBody>
+          <a:bodyPr>
+            <a:normAutofit/>
+          </a:bodyPr>
+          <a:lstStyle/>
+          <a:p>
+            <a:r>
+              <a:rPr lang="en-US" sz="3600" dirty="0" smtClean="0"/>
+              <a:t>Patterns of Enterprise Application Architecture</a:t>
+            </a:r>
+          </a:p>
+          <a:p>
+            <a:pPr lvl="1"/>
+            <a:r>
+              <a:rPr lang="en-US" sz="3200" dirty="0" smtClean="0"/>
+              <a:t>Martin Fowler</a:t>
+            </a:r>
+            <a:endParaRPr lang="en-US" sz="3200" dirty="0"/>
+          </a:p>
+        </p:txBody>
+      </p:sp>
+      <p:pic>
+        <p:nvPicPr>
+          <p:cNvPr id="5" name="Content Placeholder 4"/>
+          <p:cNvPicPr>
+            <a:picLocks noGrp="1" noChangeAspect="1"/>
+          </p:cNvPicPr>
+          <p:nvPr>
+            <p:ph sz="quarter" idx="13"/>
+          </p:nvPr>
+        </p:nvPicPr>
+        <p:blipFill>
+          <a:blip r:embed="rId2">
+            <a:extLst>
+              <a:ext uri="{28A0092B-C50C-407E-A947-70E740481C1C}">
+                <a14:useLocalDpi xmlns:a14="http://schemas.microsoft.com/office/drawing/2010/main" val="0"/>
+              </a:ext>
+            </a:extLst>
+          </a:blip>
+          <a:stretch>
+            <a:fillRect/>
+          </a:stretch>
+        </p:blipFill>
+        <p:spPr>
+          <a:xfrm>
+            <a:off x="609600" y="1676400"/>
+            <a:ext cx="4114800" cy="4114800"/>
+          </a:xfrm>
+        </p:spPr>
+      </p:pic>
+    </p:spTree>
+    <p:extLst>
+      <p:ext uri="{BB962C8B-B14F-4D97-AF65-F5344CB8AC3E}">
+        <p14:creationId xmlns:p14="http://schemas.microsoft.com/office/powerpoint/2010/main" val="4179092006"/>
+      </p:ext>
+    </p:extLst>
+  </p:cSld>
+  <p:clrMapOvr>
+    <a:masterClrMapping/>
+  </p:clrMapOvr>
+</p:sld>
+</file>
+
+<file path=ppt/slides/slide15.xml><?xml version="1.0" encoding="utf-8"?>
+<p:sld xmlns:a="http://schemas.openxmlformats.org/drawingml/2006/main" xmlns:r="http://schemas.openxmlformats.org/officeDocument/2006/relationships" xmlns:p="http://schemas.openxmlformats.org/presentationml/2006/main">
+  <p:cSld>
+    <p:spTree>
+      <p:nvGrpSpPr>
+        <p:cNvPr id="1" name=""/>
+        <p:cNvGrpSpPr/>
+        <p:nvPr/>
+      </p:nvGrpSpPr>
+      <p:grpSpPr>
+        <a:xfrm>
+          <a:off x="0" y="0"/>
+          <a:ext cx="0" cy="0"/>
+          <a:chOff x="0" y="0"/>
+          <a:chExt cx="0" cy="0"/>
+        </a:xfrm>
+      </p:grpSpPr>
+      <p:sp>
+        <p:nvSpPr>
+          <p:cNvPr id="2" name="Title 1"/>
+          <p:cNvSpPr>
+            <a:spLocks noGrp="1"/>
+          </p:cNvSpPr>
+          <p:nvPr>
+            <p:ph type="title"/>
+          </p:nvPr>
+        </p:nvSpPr>
+        <p:spPr/>
+        <p:txBody>
+          <a:bodyPr/>
+          <a:lstStyle/>
+          <a:p>
+            <a:r>
+              <a:rPr lang="en-US" dirty="0" smtClean="0"/>
+              <a:t>Further Reading</a:t>
+            </a:r>
+            <a:endParaRPr lang="en-US" dirty="0"/>
+          </a:p>
+        </p:txBody>
+      </p:sp>
+      <p:pic>
+        <p:nvPicPr>
+          <p:cNvPr id="5" name="Content Placeholder 4"/>
+          <p:cNvPicPr>
+            <a:picLocks noGrp="1" noChangeAspect="1"/>
+          </p:cNvPicPr>
+          <p:nvPr>
+            <p:ph sz="half" idx="2"/>
+          </p:nvPr>
+        </p:nvPicPr>
+        <p:blipFill>
+          <a:blip r:embed="rId2">
+            <a:extLst>
+              <a:ext uri="{28A0092B-C50C-407E-A947-70E740481C1C}">
+                <a14:useLocalDpi xmlns:a14="http://schemas.microsoft.com/office/drawing/2010/main" val="0"/>
+              </a:ext>
+            </a:extLst>
+          </a:blip>
+          <a:stretch>
+            <a:fillRect/>
+          </a:stretch>
+        </p:blipFill>
+        <p:spPr>
+          <a:xfrm>
+            <a:off x="4495800" y="1676400"/>
+            <a:ext cx="4210050" cy="4210050"/>
+          </a:xfrm>
+        </p:spPr>
+      </p:pic>
+      <p:sp>
+        <p:nvSpPr>
+          <p:cNvPr id="4" name="Content Placeholder 3"/>
+          <p:cNvSpPr>
+            <a:spLocks noGrp="1"/>
+          </p:cNvSpPr>
+          <p:nvPr>
+            <p:ph sz="quarter" idx="13"/>
+          </p:nvPr>
+        </p:nvSpPr>
+        <p:spPr/>
+        <p:txBody>
+          <a:bodyPr/>
+          <a:lstStyle/>
+          <a:p>
+            <a:r>
+              <a:rPr lang="en-US" sz="2800" dirty="0"/>
+              <a:t>Enterprise Integration Patterns: Designing, Building, and Deploying Messaging </a:t>
+            </a:r>
+            <a:r>
+              <a:rPr lang="en-US" sz="2800" dirty="0" smtClean="0"/>
+              <a:t>Solutions</a:t>
+            </a:r>
+          </a:p>
+          <a:p>
+            <a:pPr lvl="1"/>
+            <a:r>
+              <a:rPr lang="en-US" sz="2400" dirty="0" err="1"/>
+              <a:t>Gregor</a:t>
+            </a:r>
+            <a:r>
+              <a:rPr lang="en-US" sz="2400" dirty="0"/>
+              <a:t> </a:t>
+            </a:r>
+            <a:r>
+              <a:rPr lang="en-US" sz="2400" dirty="0" err="1" smtClean="0"/>
+              <a:t>Hohpe</a:t>
+            </a:r>
+            <a:endParaRPr lang="en-US" sz="2400" dirty="0" smtClean="0"/>
+          </a:p>
+          <a:p>
+            <a:pPr lvl="1"/>
+            <a:r>
+              <a:rPr lang="en-US" sz="2400" dirty="0"/>
+              <a:t>Bobby Woolf</a:t>
+            </a:r>
+          </a:p>
+        </p:txBody>
+      </p:sp>
+    </p:spTree>
+    <p:extLst>
+      <p:ext uri="{BB962C8B-B14F-4D97-AF65-F5344CB8AC3E}">
+        <p14:creationId xmlns:p14="http://schemas.microsoft.com/office/powerpoint/2010/main" val="613896221"/>
+      </p:ext>
+    </p:extLst>
+  </p:cSld>
+  <p:clrMapOvr>
+    <a:masterClrMapping/>
+  </p:clrMapOvr>
+</p:sld>
+</file>
+
+<file path=ppt/slides/slide16.xml><?xml version="1.0" encoding="utf-8"?>
+<p:sld xmlns:a="http://schemas.openxmlformats.org/drawingml/2006/main" xmlns:r="http://schemas.openxmlformats.org/officeDocument/2006/relationships" xmlns:p="http://schemas.openxmlformats.org/presentationml/2006/main">
+  <p:cSld>
+    <p:spTree>
+      <p:nvGrpSpPr>
+        <p:cNvPr id="1" name=""/>
+        <p:cNvGrpSpPr/>
+        <p:nvPr/>
+      </p:nvGrpSpPr>
+      <p:grpSpPr>
+        <a:xfrm>
+          <a:off x="0" y="0"/>
+          <a:ext cx="0" cy="0"/>
+          <a:chOff x="0" y="0"/>
+          <a:chExt cx="0" cy="0"/>
+        </a:xfrm>
+      </p:grpSpPr>
+      <p:sp>
+        <p:nvSpPr>
+          <p:cNvPr id="5" name="Title 4"/>
+          <p:cNvSpPr>
+            <a:spLocks noGrp="1"/>
+          </p:cNvSpPr>
+          <p:nvPr>
+            <p:ph type="title"/>
+          </p:nvPr>
+        </p:nvSpPr>
+        <p:spPr/>
+        <p:txBody>
+          <a:bodyPr/>
+          <a:lstStyle/>
+          <a:p>
+            <a:r>
+              <a:rPr lang="en-US" dirty="0" smtClean="0"/>
+              <a:t>Resources</a:t>
+            </a:r>
+            <a:endParaRPr lang="en-US" dirty="0"/>
+          </a:p>
+        </p:txBody>
+      </p:sp>
+      <p:sp>
+        <p:nvSpPr>
+          <p:cNvPr id="6" name="Content Placeholder 5"/>
+          <p:cNvSpPr>
+            <a:spLocks noGrp="1"/>
+          </p:cNvSpPr>
+          <p:nvPr>
+            <p:ph idx="1"/>
+          </p:nvPr>
+        </p:nvSpPr>
+        <p:spPr/>
+        <p:txBody>
+          <a:bodyPr/>
+          <a:lstStyle/>
+          <a:p>
+            <a:r>
+              <a:rPr lang="en-US" sz="3600" dirty="0" err="1" smtClean="0"/>
+              <a:t>MassTransit</a:t>
+            </a:r>
+            <a:endParaRPr lang="en-US" sz="3600" dirty="0" smtClean="0"/>
+          </a:p>
+          <a:p>
+            <a:pPr lvl="1"/>
+            <a:r>
+              <a:rPr lang="en-US" sz="2000" dirty="0" smtClean="0"/>
+              <a:t>Docs: </a:t>
+            </a:r>
+            <a:r>
+              <a:rPr lang="en-US" sz="2000" dirty="0">
+                <a:hlinkClick r:id="rId2"/>
+              </a:rPr>
+              <a:t>http://docs.masstransit-project.com</a:t>
+            </a:r>
+            <a:endParaRPr lang="en-US" sz="2000" dirty="0" smtClean="0"/>
+          </a:p>
+          <a:p>
+            <a:pPr lvl="1"/>
+            <a:r>
+              <a:rPr lang="en-US" sz="2000" dirty="0"/>
+              <a:t>Google Groups: </a:t>
+            </a:r>
+            <a:r>
+              <a:rPr lang="en-US" sz="2000" dirty="0">
+                <a:hlinkClick r:id="rId3"/>
+              </a:rPr>
+              <a:t>http://groups.google.com/group/masstransit-discuss/</a:t>
+            </a:r>
+            <a:endParaRPr lang="en-US" sz="2000" dirty="0"/>
+          </a:p>
+          <a:p>
+            <a:pPr lvl="1"/>
+            <a:r>
+              <a:rPr lang="en-US" sz="2000" dirty="0" smtClean="0"/>
+              <a:t>Chris Patterson: </a:t>
+            </a:r>
+            <a:r>
+              <a:rPr lang="en-US" sz="2000" dirty="0">
+                <a:hlinkClick r:id="rId4"/>
+              </a:rPr>
+              <a:t>http://blog.phatboyg.com</a:t>
+            </a:r>
+            <a:r>
+              <a:rPr lang="en-US" sz="2000" dirty="0" smtClean="0">
+                <a:hlinkClick r:id="rId4"/>
+              </a:rPr>
+              <a:t>/</a:t>
+            </a:r>
+            <a:endParaRPr lang="en-US" sz="2000" dirty="0" smtClean="0"/>
+          </a:p>
+          <a:p>
+            <a:pPr lvl="1"/>
+            <a:r>
+              <a:rPr lang="en-US" sz="2000" dirty="0" err="1" smtClean="0"/>
+              <a:t>Dru</a:t>
+            </a:r>
+            <a:r>
+              <a:rPr lang="en-US" sz="2000" dirty="0" smtClean="0"/>
+              <a:t> Sellers: </a:t>
+            </a:r>
+            <a:r>
+              <a:rPr lang="en-US" sz="2000" dirty="0">
+                <a:hlinkClick r:id="rId5"/>
+              </a:rPr>
+              <a:t>http://</a:t>
+            </a:r>
+            <a:r>
+              <a:rPr lang="en-US" sz="2000" dirty="0" smtClean="0">
+                <a:hlinkClick r:id="rId5"/>
+              </a:rPr>
+              <a:t>codebetter.com/drusellers/</a:t>
+            </a:r>
+            <a:endParaRPr lang="en-US" sz="2000" dirty="0" smtClean="0"/>
+          </a:p>
+          <a:p>
+            <a:r>
+              <a:rPr lang="en-US" sz="3600" dirty="0" smtClean="0"/>
+              <a:t>Messaging/Distributed Systems</a:t>
+            </a:r>
+          </a:p>
+          <a:p>
+            <a:pPr lvl="1"/>
+            <a:r>
+              <a:rPr lang="en-US" sz="2000" dirty="0" err="1" smtClean="0"/>
+              <a:t>Udi</a:t>
+            </a:r>
+            <a:r>
+              <a:rPr lang="en-US" sz="2000" dirty="0" smtClean="0"/>
+              <a:t> </a:t>
+            </a:r>
+            <a:r>
+              <a:rPr lang="en-US" sz="2000" dirty="0" err="1" smtClean="0"/>
+              <a:t>Dahan</a:t>
+            </a:r>
+            <a:r>
+              <a:rPr lang="en-US" sz="2000" dirty="0" smtClean="0"/>
+              <a:t>: </a:t>
+            </a:r>
+            <a:r>
+              <a:rPr lang="en-US" sz="2000" dirty="0">
+                <a:hlinkClick r:id="rId6"/>
+              </a:rPr>
+              <a:t>http://www.udidahan.com</a:t>
+            </a:r>
+            <a:r>
+              <a:rPr lang="en-US" sz="2000" dirty="0" smtClean="0">
+                <a:hlinkClick r:id="rId6"/>
+              </a:rPr>
+              <a:t>/</a:t>
+            </a:r>
+            <a:endParaRPr lang="en-US" sz="2000" dirty="0" smtClean="0"/>
+          </a:p>
+          <a:p>
+            <a:pPr lvl="1"/>
+            <a:r>
+              <a:rPr lang="en-US" sz="2000" dirty="0" smtClean="0"/>
+              <a:t>Martin Fowler – Patterns in Enterprise Software: </a:t>
+            </a:r>
+            <a:r>
+              <a:rPr lang="en-US" sz="1800" dirty="0">
+                <a:hlinkClick r:id="rId7"/>
+              </a:rPr>
+              <a:t>http://www.martinfowler.com/articles/enterprisePatterns.html</a:t>
+            </a:r>
+            <a:endParaRPr lang="en-US" sz="1800" dirty="0" smtClean="0"/>
+          </a:p>
+        </p:txBody>
+      </p:sp>
+    </p:spTree>
+    <p:extLst>
+      <p:ext uri="{BB962C8B-B14F-4D97-AF65-F5344CB8AC3E}">
+        <p14:creationId xmlns:p14="http://schemas.microsoft.com/office/powerpoint/2010/main" val="3419404741"/>
+      </p:ext>
+    </p:extLst>
+  </p:cSld>
+  <p:clrMapOvr>
+    <a:masterClrMapping/>
+  </p:clrMapOvr>
+</p:sld>
+</file>
+
+<file path=ppt/slides/slide17.xml><?xml version="1.0" encoding="utf-8"?>
+<p:sld xmlns:a="http://schemas.openxmlformats.org/drawingml/2006/main" xmlns:r="http://schemas.openxmlformats.org/officeDocument/2006/relationships" xmlns:p="http://schemas.openxmlformats.org/presentationml/2006/main">
+  <p:cSld>
+    <p:spTree>
+      <p:nvGrpSpPr>
+        <p:cNvPr id="1" name=""/>
+        <p:cNvGrpSpPr/>
+        <p:nvPr/>
+      </p:nvGrpSpPr>
+      <p:grpSpPr>
+        <a:xfrm>
+          <a:off x="0" y="0"/>
+          <a:ext cx="0" cy="0"/>
+          <a:chOff x="0" y="0"/>
+          <a:chExt cx="0" cy="0"/>
+        </a:xfrm>
+      </p:grpSpPr>
+      <p:sp>
+        <p:nvSpPr>
+          <p:cNvPr id="7" name="Title 6"/>
+          <p:cNvSpPr>
+            <a:spLocks noGrp="1"/>
+          </p:cNvSpPr>
+          <p:nvPr>
+            <p:ph type="title"/>
+          </p:nvPr>
+        </p:nvSpPr>
+        <p:spPr/>
+        <p:txBody>
+          <a:bodyPr/>
+          <a:lstStyle/>
+          <a:p>
+            <a:r>
+              <a:rPr lang="en-US" dirty="0" smtClean="0"/>
+              <a:t>Questions?</a:t>
+            </a:r>
+            <a:endParaRPr lang="en-US" dirty="0"/>
+          </a:p>
+        </p:txBody>
+      </p:sp>
+      <p:sp>
+        <p:nvSpPr>
+          <p:cNvPr id="8" name="Content Placeholder 7"/>
+          <p:cNvSpPr>
+            <a:spLocks noGrp="1"/>
+          </p:cNvSpPr>
+          <p:nvPr>
+            <p:ph idx="1"/>
+          </p:nvPr>
+        </p:nvSpPr>
+        <p:spPr/>
+        <p:txBody>
+          <a:bodyPr/>
+          <a:lstStyle/>
+          <a:p>
+            <a:endParaRPr lang="en-US"/>
+          </a:p>
+        </p:txBody>
+      </p:sp>
+    </p:spTree>
+    <p:extLst>
+      <p:ext uri="{BB962C8B-B14F-4D97-AF65-F5344CB8AC3E}">
+        <p14:creationId xmlns:p14="http://schemas.microsoft.com/office/powerpoint/2010/main" val="3572040917"/>
+      </p:ext>
+    </p:extLst>
+  </p:cSld>
+  <p:clrMapOvr>
+    <a:masterClrMapping/>
+  </p:clrMapOvr>
+</p:sld>
+</file>
+
+<file path=ppt/slides/slide18.xml><?xml version="1.0" encoding="utf-8"?>
+<p:sld xmlns:a="http://schemas.openxmlformats.org/drawingml/2006/main" xmlns:r="http://schemas.openxmlformats.org/officeDocument/2006/relationships" xmlns:p="http://schemas.openxmlformats.org/presentationml/2006/main">
+  <p:cSld>
+    <p:spTree>
+      <p:nvGrpSpPr>
+        <p:cNvPr id="1" name=""/>
+        <p:cNvGrpSpPr/>
+        <p:nvPr/>
+      </p:nvGrpSpPr>
+      <p:grpSpPr>
+        <a:xfrm>
+          <a:off x="0" y="0"/>
+          <a:ext cx="0" cy="0"/>
+          <a:chOff x="0" y="0"/>
+          <a:chExt cx="0" cy="0"/>
+        </a:xfrm>
+      </p:grpSpPr>
+      <p:sp>
+        <p:nvSpPr>
+          <p:cNvPr id="2" name="Title 1"/>
+          <p:cNvSpPr>
+            <a:spLocks noGrp="1"/>
+          </p:cNvSpPr>
+          <p:nvPr>
+            <p:ph type="title"/>
+          </p:nvPr>
+        </p:nvSpPr>
+        <p:spPr/>
+        <p:txBody>
+          <a:bodyPr/>
+          <a:lstStyle/>
+          <a:p>
+            <a:r>
+              <a:rPr lang="en-US" dirty="0" smtClean="0"/>
+              <a:t>Thank You!</a:t>
+            </a:r>
+            <a:endParaRPr lang="en-US" dirty="0"/>
+          </a:p>
+        </p:txBody>
+      </p:sp>
+      <p:sp>
+        <p:nvSpPr>
+          <p:cNvPr id="3" name="Content Placeholder 2"/>
+          <p:cNvSpPr>
+            <a:spLocks noGrp="1"/>
+          </p:cNvSpPr>
+          <p:nvPr>
+            <p:ph idx="1"/>
+          </p:nvPr>
+        </p:nvSpPr>
+        <p:spPr/>
+        <p:txBody>
+          <a:bodyPr/>
+          <a:lstStyle/>
+          <a:p>
+            <a:r>
+              <a:rPr lang="en-US" sz="3200" dirty="0" err="1" smtClean="0"/>
+              <a:t>Github</a:t>
+            </a:r>
+            <a:r>
+              <a:rPr lang="en-US" sz="3200" dirty="0" smtClean="0"/>
+              <a:t>: </a:t>
+            </a:r>
+            <a:r>
+              <a:rPr lang="en-US" sz="3200" dirty="0" smtClean="0">
+                <a:hlinkClick r:id="rId2"/>
+              </a:rPr>
+              <a:t>https://github.com/ekepes</a:t>
+            </a:r>
+            <a:endParaRPr lang="en-US" sz="3200" dirty="0" smtClean="0"/>
+          </a:p>
+          <a:p>
+            <a:r>
+              <a:rPr lang="en-US" sz="3200" dirty="0" smtClean="0"/>
+              <a:t>Twitter: @</a:t>
+            </a:r>
+            <a:r>
+              <a:rPr lang="en-US" sz="3200" dirty="0" err="1" smtClean="0"/>
+              <a:t>ekepes</a:t>
+            </a:r>
+            <a:endParaRPr lang="en-US" sz="3200" dirty="0" smtClean="0"/>
+          </a:p>
+          <a:p>
+            <a:r>
+              <a:rPr lang="en-US" sz="3200" dirty="0" smtClean="0"/>
+              <a:t>Blog: </a:t>
+            </a:r>
+            <a:r>
+              <a:rPr lang="en-US" sz="3200" dirty="0" smtClean="0">
+                <a:hlinkClick r:id="rId3"/>
+              </a:rPr>
+              <a:t>http://erickepes.com</a:t>
+            </a:r>
+            <a:endParaRPr lang="en-US" sz="3200" dirty="0" smtClean="0"/>
+          </a:p>
+          <a:p>
+            <a:r>
+              <a:rPr lang="en-US" sz="3200" dirty="0" smtClean="0"/>
+              <a:t>Email: </a:t>
+            </a:r>
+            <a:r>
+              <a:rPr lang="en-US" sz="3200" dirty="0" smtClean="0">
+                <a:hlinkClick r:id="rId4"/>
+              </a:rPr>
+              <a:t>ekepes@gmail.com</a:t>
+            </a:r>
+            <a:endParaRPr lang="en-US" sz="3200" dirty="0" smtClean="0"/>
+          </a:p>
+          <a:p>
+            <a:endParaRPr lang="en-US" dirty="0"/>
+          </a:p>
+          <a:p>
+            <a:r>
+              <a:rPr lang="en-US" sz="3200" dirty="0" smtClean="0"/>
+              <a:t>Demos and Slides:</a:t>
+            </a:r>
+          </a:p>
+          <a:p>
+            <a:pPr lvl="1"/>
+            <a:r>
+              <a:rPr lang="en-US" sz="2800" dirty="0" smtClean="0">
+                <a:hlinkClick r:id="rId5"/>
+              </a:rPr>
+              <a:t>https://github.com/ekepes/Presentations</a:t>
+            </a:r>
+            <a:endParaRPr lang="en-US" sz="2800" dirty="0"/>
+          </a:p>
+        </p:txBody>
+      </p:sp>
+    </p:spTree>
+    <p:extLst>
+      <p:ext uri="{BB962C8B-B14F-4D97-AF65-F5344CB8AC3E}">
+        <p14:creationId xmlns:p14="http://schemas.microsoft.com/office/powerpoint/2010/main" val="3985796606"/>
       </p:ext>
     </p:extLst>
   </p:cSld>
@@ -3476,34 +4487,30 @@
             <p:ph sz="half" idx="2"/>
           </p:nvPr>
         </p:nvSpPr>
-        <p:spPr/>
-        <p:txBody>
-          <a:bodyPr/>
-          <a:lstStyle/>
-          <a:p>
-            <a:r>
-              <a:rPr lang="en-US" dirty="0" err="1" smtClean="0"/>
-              <a:t>.Net</a:t>
-            </a:r>
-            <a:r>
-              <a:rPr lang="en-US" dirty="0" smtClean="0"/>
-              <a:t> Open Source Enterprise Service Bus (ESB)</a:t>
-            </a:r>
-          </a:p>
-          <a:p>
-            <a:r>
-              <a:rPr lang="en-US" dirty="0">
+        <p:spPr>
+          <a:xfrm>
+            <a:off x="533400" y="1600201"/>
+            <a:ext cx="8153400" cy="685799"/>
+          </a:xfrm>
+        </p:spPr>
+        <p:txBody>
+          <a:bodyPr/>
+          <a:lstStyle/>
+          <a:p>
+            <a:pPr algn="ctr"/>
+            <a:r>
+              <a:rPr lang="en-US" sz="3200" dirty="0" smtClean="0">
                 <a:hlinkClick r:id="rId2"/>
               </a:rPr>
-              <a:t>h</a:t>
-            </a:r>
-            <a:r>
-              <a:rPr lang="en-US" dirty="0" smtClean="0">
+              <a:t>http</a:t>
+            </a:r>
+            <a:r>
+              <a:rPr lang="en-US" sz="3200" dirty="0" smtClean="0">
                 <a:hlinkClick r:id="rId2"/>
               </a:rPr>
-              <a:t>ttp://masstransit-project.com/</a:t>
-            </a:r>
-            <a:endParaRPr lang="en-US" dirty="0" smtClean="0"/>
+              <a:t>://masstransit-project.com/</a:t>
+            </a:r>
+            <a:endParaRPr lang="en-US" sz="3200" dirty="0" smtClean="0"/>
           </a:p>
           <a:p>
             <a:endParaRPr lang="en-US" dirty="0"/>
@@ -3534,7 +4541,7 @@
         </p:blipFill>
         <p:spPr>
           <a:xfrm>
-            <a:off x="365125" y="2105888"/>
+            <a:off x="2362200" y="2438400"/>
             <a:ext cx="4041775" cy="3514586"/>
           </a:xfrm>
         </p:spPr>
@@ -3571,7 +4578,7 @@
       </p:grpSpPr>
       <p:sp>
         <p:nvSpPr>
-          <p:cNvPr id="7" name="Title 6"/>
+          <p:cNvPr id="2" name="Title 1"/>
           <p:cNvSpPr>
             <a:spLocks noGrp="1"/>
           </p:cNvSpPr>
@@ -3586,7 +4593,7 @@
           <a:p>
             <a:r>
               <a:rPr lang="en-US" dirty="0" smtClean="0"/>
-              <a:t>Questions?</a:t>
+              <a:t>Messaging</a:t>
             </a:r>
             <a:endParaRPr lang="en-US" dirty="0"/>
           </a:p>
@@ -3594,7 +4601,7 @@
       </p:sp>
       <p:sp>
         <p:nvSpPr>
-          <p:cNvPr id="8" name="Content Placeholder 7"/>
+          <p:cNvPr id="3" name="Content Placeholder 2"/>
           <p:cNvSpPr>
             <a:spLocks noGrp="1"/>
           </p:cNvSpPr>
@@ -3607,14 +4614,32 @@
           <a:bodyPr/>
           <a:lstStyle/>
           <a:p>
-            <a:endParaRPr lang="en-US"/>
+            <a:r>
+              <a:rPr lang="en-US" sz="3600" dirty="0" smtClean="0"/>
+              <a:t>Asynchronous</a:t>
+            </a:r>
+          </a:p>
+          <a:p>
+            <a:r>
+              <a:rPr lang="en-US" sz="3600" dirty="0" smtClean="0"/>
+              <a:t>Tolerant of Network Issues</a:t>
+            </a:r>
+          </a:p>
+          <a:p>
+            <a:r>
+              <a:rPr lang="en-US" sz="3600" dirty="0"/>
+              <a:t>Reliable Delivery</a:t>
+            </a:r>
+          </a:p>
+          <a:p>
+            <a:endParaRPr lang="en-US" dirty="0"/>
           </a:p>
         </p:txBody>
       </p:sp>
     </p:spTree>
     <p:extLst>
       <p:ext uri="{BB962C8B-B14F-4D97-AF65-F5344CB8AC3E}">
-        <p14:creationId xmlns:p14="http://schemas.microsoft.com/office/powerpoint/2010/main" val="3572040917"/>
+        <p14:creationId xmlns:p14="http://schemas.microsoft.com/office/powerpoint/2010/main" val="1857996793"/>
       </p:ext>
     </p:extLst>
   </p:cSld>
@@ -3658,7 +4683,7 @@
           <a:p>
             <a:r>
               <a:rPr lang="en-US" dirty="0" smtClean="0"/>
-              <a:t>Thank You!</a:t>
+              <a:t>Publish/Subscribe</a:t>
             </a:r>
             <a:endParaRPr lang="en-US" dirty="0"/>
           </a:p>
@@ -3676,87 +4701,435 @@
         </p:nvSpPr>
         <p:spPr/>
         <p:txBody>
-          <a:bodyPr/>
-          <a:lstStyle/>
-          <a:p>
-            <a:r>
-              <a:rPr lang="en-US" dirty="0" err="1" smtClean="0"/>
-              <a:t>Github</a:t>
-            </a:r>
-            <a:r>
-              <a:rPr lang="en-US" dirty="0" smtClean="0"/>
-              <a:t>: </a:t>
-            </a:r>
-            <a:r>
-              <a:rPr lang="en-US" dirty="0" smtClean="0">
-                <a:hlinkClick r:id="rId2"/>
-              </a:rPr>
-              <a:t>https://github.com/ekepes</a:t>
-            </a:r>
-            <a:endParaRPr lang="en-US" dirty="0" smtClean="0"/>
-          </a:p>
-          <a:p>
-            <a:r>
-              <a:rPr lang="en-US" dirty="0" smtClean="0"/>
-              <a:t>Twitter: @</a:t>
-            </a:r>
-            <a:r>
-              <a:rPr lang="en-US" dirty="0" err="1" smtClean="0"/>
-              <a:t>ekepes</a:t>
-            </a:r>
-            <a:endParaRPr lang="en-US" dirty="0" smtClean="0"/>
-          </a:p>
-          <a:p>
-            <a:r>
-              <a:rPr lang="en-US" dirty="0" smtClean="0"/>
-              <a:t>Blog: </a:t>
-            </a:r>
-            <a:r>
-              <a:rPr lang="en-US" dirty="0" smtClean="0">
-                <a:hlinkClick r:id="rId3"/>
-              </a:rPr>
-              <a:t>http://erickepes.com</a:t>
-            </a:r>
-            <a:endParaRPr lang="en-US" dirty="0" smtClean="0"/>
-          </a:p>
-          <a:p>
-            <a:r>
-              <a:rPr lang="en-US" dirty="0" smtClean="0"/>
-              <a:t>Email: </a:t>
-            </a:r>
-            <a:r>
-              <a:rPr lang="en-US" dirty="0" smtClean="0">
-                <a:hlinkClick r:id="rId4"/>
-              </a:rPr>
-              <a:t>ekepes@gmail.com</a:t>
-            </a:r>
-            <a:endParaRPr lang="en-US" dirty="0" smtClean="0"/>
-          </a:p>
-          <a:p>
-            <a:endParaRPr lang="en-US" dirty="0"/>
-          </a:p>
-          <a:p>
-            <a:r>
-              <a:rPr lang="en-US" dirty="0" smtClean="0"/>
-              <a:t>Demos and Slides:</a:t>
-            </a:r>
-          </a:p>
-          <a:p>
-            <a:pPr lvl="1"/>
-            <a:r>
-              <a:rPr lang="en-US" dirty="0" smtClean="0">
-                <a:hlinkClick r:id="rId5"/>
-              </a:rPr>
-              <a:t>https://github.com/ekepes/Presentations</a:t>
-            </a:r>
-            <a:endParaRPr lang="en-US" dirty="0"/>
+          <a:bodyPr>
+            <a:normAutofit/>
+          </a:bodyPr>
+          <a:lstStyle/>
+          <a:p>
+            <a:r>
+              <a:rPr lang="en-US" sz="3600" dirty="0" smtClean="0"/>
+              <a:t>Publishers and Subscribers</a:t>
+            </a:r>
           </a:p>
         </p:txBody>
       </p:sp>
     </p:spTree>
     <p:extLst>
       <p:ext uri="{BB962C8B-B14F-4D97-AF65-F5344CB8AC3E}">
-        <p14:creationId xmlns:p14="http://schemas.microsoft.com/office/powerpoint/2010/main" val="3985796606"/>
+        <p14:creationId xmlns:p14="http://schemas.microsoft.com/office/powerpoint/2010/main" val="1076834266"/>
+      </p:ext>
+    </p:extLst>
+  </p:cSld>
+  <p:clrMapOvr>
+    <a:masterClrMapping/>
+  </p:clrMapOvr>
+</p:sld>
+</file>
+
+<file path=ppt/slides/slide5.xml><?xml version="1.0" encoding="utf-8"?>
+<p:sld xmlns:a="http://schemas.openxmlformats.org/drawingml/2006/main" xmlns:r="http://schemas.openxmlformats.org/officeDocument/2006/relationships" xmlns:p="http://schemas.openxmlformats.org/presentationml/2006/main">
+  <p:cSld>
+    <p:spTree>
+      <p:nvGrpSpPr>
+        <p:cNvPr id="1" name=""/>
+        <p:cNvGrpSpPr/>
+        <p:nvPr/>
+      </p:nvGrpSpPr>
+      <p:grpSpPr>
+        <a:xfrm>
+          <a:off x="0" y="0"/>
+          <a:ext cx="0" cy="0"/>
+          <a:chOff x="0" y="0"/>
+          <a:chExt cx="0" cy="0"/>
+        </a:xfrm>
+      </p:grpSpPr>
+      <p:sp>
+        <p:nvSpPr>
+          <p:cNvPr id="2" name="Title 1"/>
+          <p:cNvSpPr>
+            <a:spLocks noGrp="1"/>
+          </p:cNvSpPr>
+          <p:nvPr>
+            <p:ph type="title"/>
+          </p:nvPr>
+        </p:nvSpPr>
+        <p:spPr/>
+        <p:txBody>
+          <a:bodyPr/>
+          <a:lstStyle/>
+          <a:p>
+            <a:r>
+              <a:rPr lang="en-US" dirty="0" smtClean="0"/>
+              <a:t>Publish/Subscribe</a:t>
+            </a:r>
+            <a:endParaRPr lang="en-US" dirty="0"/>
+          </a:p>
+        </p:txBody>
+      </p:sp>
+      <p:sp>
+        <p:nvSpPr>
+          <p:cNvPr id="3" name="Content Placeholder 2"/>
+          <p:cNvSpPr>
+            <a:spLocks noGrp="1"/>
+          </p:cNvSpPr>
+          <p:nvPr>
+            <p:ph idx="1"/>
+          </p:nvPr>
+        </p:nvSpPr>
+        <p:spPr/>
+        <p:txBody>
+          <a:bodyPr>
+            <a:normAutofit/>
+          </a:bodyPr>
+          <a:lstStyle/>
+          <a:p>
+            <a:r>
+              <a:rPr lang="en-US" sz="3600" dirty="0" smtClean="0"/>
+              <a:t>Two Different Styles</a:t>
+            </a:r>
+          </a:p>
+          <a:p>
+            <a:pPr lvl="1"/>
+            <a:r>
+              <a:rPr lang="en-US" sz="3600" dirty="0" smtClean="0"/>
+              <a:t>Broker</a:t>
+            </a:r>
+          </a:p>
+          <a:p>
+            <a:pPr lvl="1"/>
+            <a:r>
+              <a:rPr lang="en-US" sz="3600" dirty="0" smtClean="0"/>
+              <a:t>Bus</a:t>
+            </a:r>
+          </a:p>
+        </p:txBody>
+      </p:sp>
+    </p:spTree>
+    <p:extLst>
+      <p:ext uri="{BB962C8B-B14F-4D97-AF65-F5344CB8AC3E}">
+        <p14:creationId xmlns:p14="http://schemas.microsoft.com/office/powerpoint/2010/main" val="1700132643"/>
+      </p:ext>
+    </p:extLst>
+  </p:cSld>
+  <p:clrMapOvr>
+    <a:masterClrMapping/>
+  </p:clrMapOvr>
+</p:sld>
+</file>
+
+<file path=ppt/slides/slide6.xml><?xml version="1.0" encoding="utf-8"?>
+<p:sld xmlns:a="http://schemas.openxmlformats.org/drawingml/2006/main" xmlns:r="http://schemas.openxmlformats.org/officeDocument/2006/relationships" xmlns:p="http://schemas.openxmlformats.org/presentationml/2006/main">
+  <p:cSld>
+    <p:spTree>
+      <p:nvGrpSpPr>
+        <p:cNvPr id="1" name=""/>
+        <p:cNvGrpSpPr/>
+        <p:nvPr/>
+      </p:nvGrpSpPr>
+      <p:grpSpPr>
+        <a:xfrm>
+          <a:off x="0" y="0"/>
+          <a:ext cx="0" cy="0"/>
+          <a:chOff x="0" y="0"/>
+          <a:chExt cx="0" cy="0"/>
+        </a:xfrm>
+      </p:grpSpPr>
+      <p:sp>
+        <p:nvSpPr>
+          <p:cNvPr id="5" name="Title 4"/>
+          <p:cNvSpPr>
+            <a:spLocks noGrp="1"/>
+          </p:cNvSpPr>
+          <p:nvPr>
+            <p:ph type="title"/>
+          </p:nvPr>
+        </p:nvSpPr>
+        <p:spPr/>
+        <p:txBody>
+          <a:bodyPr/>
+          <a:lstStyle/>
+          <a:p>
+            <a:r>
+              <a:rPr lang="en-US" dirty="0" smtClean="0"/>
+              <a:t>Enterprise Service Bus</a:t>
+            </a:r>
+            <a:endParaRPr lang="en-US" dirty="0"/>
+          </a:p>
+        </p:txBody>
+      </p:sp>
+      <p:sp>
+        <p:nvSpPr>
+          <p:cNvPr id="6" name="Content Placeholder 5"/>
+          <p:cNvSpPr>
+            <a:spLocks noGrp="1"/>
+          </p:cNvSpPr>
+          <p:nvPr>
+            <p:ph idx="1"/>
+          </p:nvPr>
+        </p:nvSpPr>
+        <p:spPr/>
+        <p:txBody>
+          <a:bodyPr>
+            <a:normAutofit/>
+          </a:bodyPr>
+          <a:lstStyle/>
+          <a:p>
+            <a:r>
+              <a:rPr lang="en-US" sz="3600" dirty="0" smtClean="0"/>
+              <a:t>Decoupled Services</a:t>
+            </a:r>
+          </a:p>
+          <a:p>
+            <a:r>
+              <a:rPr lang="en-US" sz="3600" dirty="0" smtClean="0"/>
+              <a:t>Minimal Central Control</a:t>
+            </a:r>
+          </a:p>
+          <a:p>
+            <a:r>
+              <a:rPr lang="en-US" sz="3600" dirty="0" smtClean="0"/>
+              <a:t>Point-to-Point Communication</a:t>
+            </a:r>
+            <a:endParaRPr lang="en-US" sz="3600" dirty="0"/>
+          </a:p>
+        </p:txBody>
+      </p:sp>
+    </p:spTree>
+    <p:extLst>
+      <p:ext uri="{BB962C8B-B14F-4D97-AF65-F5344CB8AC3E}">
+        <p14:creationId xmlns:p14="http://schemas.microsoft.com/office/powerpoint/2010/main" val="3386540948"/>
+      </p:ext>
+    </p:extLst>
+  </p:cSld>
+  <p:clrMapOvr>
+    <a:masterClrMapping/>
+  </p:clrMapOvr>
+</p:sld>
+</file>
+
+<file path=ppt/slides/slide7.xml><?xml version="1.0" encoding="utf-8"?>
+<p:sld xmlns:a="http://schemas.openxmlformats.org/drawingml/2006/main" xmlns:r="http://schemas.openxmlformats.org/officeDocument/2006/relationships" xmlns:p="http://schemas.openxmlformats.org/presentationml/2006/main">
+  <p:cSld>
+    <p:spTree>
+      <p:nvGrpSpPr>
+        <p:cNvPr id="1" name=""/>
+        <p:cNvGrpSpPr/>
+        <p:nvPr/>
+      </p:nvGrpSpPr>
+      <p:grpSpPr>
+        <a:xfrm>
+          <a:off x="0" y="0"/>
+          <a:ext cx="0" cy="0"/>
+          <a:chOff x="0" y="0"/>
+          <a:chExt cx="0" cy="0"/>
+        </a:xfrm>
+      </p:grpSpPr>
+      <p:sp>
+        <p:nvSpPr>
+          <p:cNvPr id="2" name="Title 1"/>
+          <p:cNvSpPr>
+            <a:spLocks noGrp="1"/>
+          </p:cNvSpPr>
+          <p:nvPr>
+            <p:ph type="title"/>
+          </p:nvPr>
+        </p:nvSpPr>
+        <p:spPr/>
+        <p:txBody>
+          <a:bodyPr/>
+          <a:lstStyle/>
+          <a:p>
+            <a:r>
+              <a:rPr lang="en-US" dirty="0" smtClean="0"/>
+              <a:t>Caveats</a:t>
+            </a:r>
+            <a:endParaRPr lang="en-US" dirty="0"/>
+          </a:p>
+        </p:txBody>
+      </p:sp>
+      <p:sp>
+        <p:nvSpPr>
+          <p:cNvPr id="3" name="Content Placeholder 2"/>
+          <p:cNvSpPr>
+            <a:spLocks noGrp="1"/>
+          </p:cNvSpPr>
+          <p:nvPr>
+            <p:ph idx="1"/>
+          </p:nvPr>
+        </p:nvSpPr>
+        <p:spPr/>
+        <p:txBody>
+          <a:bodyPr>
+            <a:normAutofit/>
+          </a:bodyPr>
+          <a:lstStyle/>
+          <a:p>
+            <a:r>
+              <a:rPr lang="en-US" sz="3600" dirty="0" smtClean="0"/>
+              <a:t>Don’t Do Request/Response</a:t>
+            </a:r>
+          </a:p>
+          <a:p>
+            <a:r>
+              <a:rPr lang="en-US" sz="3600" dirty="0" smtClean="0"/>
+              <a:t>Distributed Transactions</a:t>
+            </a:r>
+            <a:endParaRPr lang="en-US" sz="3600" dirty="0"/>
+          </a:p>
+        </p:txBody>
+      </p:sp>
+    </p:spTree>
+    <p:extLst>
+      <p:ext uri="{BB962C8B-B14F-4D97-AF65-F5344CB8AC3E}">
+        <p14:creationId xmlns:p14="http://schemas.microsoft.com/office/powerpoint/2010/main" val="2719102283"/>
+      </p:ext>
+    </p:extLst>
+  </p:cSld>
+  <p:clrMapOvr>
+    <a:masterClrMapping/>
+  </p:clrMapOvr>
+</p:sld>
+</file>
+
+<file path=ppt/slides/slide8.xml><?xml version="1.0" encoding="utf-8"?>
+<p:sld xmlns:a="http://schemas.openxmlformats.org/drawingml/2006/main" xmlns:r="http://schemas.openxmlformats.org/officeDocument/2006/relationships" xmlns:p="http://schemas.openxmlformats.org/presentationml/2006/main">
+  <p:cSld>
+    <p:spTree>
+      <p:nvGrpSpPr>
+        <p:cNvPr id="1" name=""/>
+        <p:cNvGrpSpPr/>
+        <p:nvPr/>
+      </p:nvGrpSpPr>
+      <p:grpSpPr>
+        <a:xfrm>
+          <a:off x="0" y="0"/>
+          <a:ext cx="0" cy="0"/>
+          <a:chOff x="0" y="0"/>
+          <a:chExt cx="0" cy="0"/>
+        </a:xfrm>
+      </p:grpSpPr>
+      <p:sp>
+        <p:nvSpPr>
+          <p:cNvPr id="7" name="Title 6"/>
+          <p:cNvSpPr>
+            <a:spLocks noGrp="1"/>
+          </p:cNvSpPr>
+          <p:nvPr>
+            <p:ph type="title"/>
+          </p:nvPr>
+        </p:nvSpPr>
+        <p:spPr/>
+        <p:txBody>
+          <a:bodyPr/>
+          <a:lstStyle/>
+          <a:p>
+            <a:r>
+              <a:rPr lang="en-US" dirty="0" err="1" smtClean="0"/>
+              <a:t>MassTransit</a:t>
+            </a:r>
+            <a:r>
+              <a:rPr lang="en-US" dirty="0" smtClean="0"/>
+              <a:t> Hello World</a:t>
+            </a:r>
+            <a:endParaRPr lang="en-US" dirty="0"/>
+          </a:p>
+        </p:txBody>
+      </p:sp>
+      <p:sp>
+        <p:nvSpPr>
+          <p:cNvPr id="8" name="Text Placeholder 7"/>
+          <p:cNvSpPr>
+            <a:spLocks noGrp="1"/>
+          </p:cNvSpPr>
+          <p:nvPr>
+            <p:ph type="body" idx="1"/>
+          </p:nvPr>
+        </p:nvSpPr>
+        <p:spPr/>
+        <p:txBody>
+          <a:bodyPr/>
+          <a:lstStyle/>
+          <a:p>
+            <a:endParaRPr lang="en-US" dirty="0"/>
+          </a:p>
+        </p:txBody>
+      </p:sp>
+    </p:spTree>
+    <p:extLst>
+      <p:ext uri="{BB962C8B-B14F-4D97-AF65-F5344CB8AC3E}">
+        <p14:creationId xmlns:p14="http://schemas.microsoft.com/office/powerpoint/2010/main" val="1653368776"/>
+      </p:ext>
+    </p:extLst>
+  </p:cSld>
+  <p:clrMapOvr>
+    <a:masterClrMapping/>
+  </p:clrMapOvr>
+</p:sld>
+</file>
+
+<file path=ppt/slides/slide9.xml><?xml version="1.0" encoding="utf-8"?>
+<p:sld xmlns:a="http://schemas.openxmlformats.org/drawingml/2006/main" xmlns:r="http://schemas.openxmlformats.org/officeDocument/2006/relationships" xmlns:p="http://schemas.openxmlformats.org/presentationml/2006/main">
+  <p:cSld>
+    <p:spTree>
+      <p:nvGrpSpPr>
+        <p:cNvPr id="1" name=""/>
+        <p:cNvGrpSpPr/>
+        <p:nvPr/>
+      </p:nvGrpSpPr>
+      <p:grpSpPr>
+        <a:xfrm>
+          <a:off x="0" y="0"/>
+          <a:ext cx="0" cy="0"/>
+          <a:chOff x="0" y="0"/>
+          <a:chExt cx="0" cy="0"/>
+        </a:xfrm>
+      </p:grpSpPr>
+      <p:sp>
+        <p:nvSpPr>
+          <p:cNvPr id="7" name="Title 6"/>
+          <p:cNvSpPr>
+            <a:spLocks noGrp="1"/>
+          </p:cNvSpPr>
+          <p:nvPr>
+            <p:ph type="title"/>
+          </p:nvPr>
+        </p:nvSpPr>
+        <p:spPr/>
+        <p:txBody>
+          <a:bodyPr/>
+          <a:lstStyle/>
+          <a:p>
+            <a:r>
+              <a:rPr lang="en-US" dirty="0" smtClean="0"/>
+              <a:t>Auditing Demo</a:t>
+            </a:r>
+            <a:endParaRPr lang="en-US" dirty="0"/>
+          </a:p>
+        </p:txBody>
+      </p:sp>
+      <p:sp>
+        <p:nvSpPr>
+          <p:cNvPr id="8" name="Text Placeholder 7"/>
+          <p:cNvSpPr>
+            <a:spLocks noGrp="1"/>
+          </p:cNvSpPr>
+          <p:nvPr>
+            <p:ph type="body" idx="1"/>
+          </p:nvPr>
+        </p:nvSpPr>
+        <p:spPr/>
+        <p:txBody>
+          <a:bodyPr/>
+          <a:lstStyle/>
+          <a:p>
+            <a:endParaRPr lang="en-US"/>
+          </a:p>
+        </p:txBody>
+      </p:sp>
+    </p:spTree>
+    <p:extLst>
+      <p:ext uri="{BB962C8B-B14F-4D97-AF65-F5344CB8AC3E}">
+        <p14:creationId xmlns:p14="http://schemas.microsoft.com/office/powerpoint/2010/main" val="3544512129"/>
       </p:ext>
     </p:extLst>
   </p:cSld>

</xml_diff>